<commit_message>
Moves files to the 75 web under the hood folder
</commit_message>
<xml_diff>
--- a/lectures/075_web_under_the_hood/The web, under the hood.pptx
+++ b/lectures/075_web_under_the_hood/The web, under the hood.pptx
@@ -26,23 +26,24 @@
     <p:sldId id="275" r:id="rId20"/>
     <p:sldId id="277" r:id="rId21"/>
     <p:sldId id="278" r:id="rId22"/>
-    <p:sldId id="292" r:id="rId23"/>
-    <p:sldId id="293" r:id="rId24"/>
-    <p:sldId id="276" r:id="rId25"/>
-    <p:sldId id="287" r:id="rId26"/>
-    <p:sldId id="288" r:id="rId27"/>
-    <p:sldId id="283" r:id="rId28"/>
-    <p:sldId id="279" r:id="rId29"/>
-    <p:sldId id="281" r:id="rId30"/>
-    <p:sldId id="289" r:id="rId31"/>
-    <p:sldId id="285" r:id="rId32"/>
-    <p:sldId id="284" r:id="rId33"/>
-    <p:sldId id="286" r:id="rId34"/>
-    <p:sldId id="290" r:id="rId35"/>
-    <p:sldId id="291" r:id="rId36"/>
-    <p:sldId id="294" r:id="rId37"/>
-    <p:sldId id="265" r:id="rId38"/>
-    <p:sldId id="266" r:id="rId39"/>
+    <p:sldId id="295" r:id="rId23"/>
+    <p:sldId id="292" r:id="rId24"/>
+    <p:sldId id="293" r:id="rId25"/>
+    <p:sldId id="276" r:id="rId26"/>
+    <p:sldId id="287" r:id="rId27"/>
+    <p:sldId id="288" r:id="rId28"/>
+    <p:sldId id="283" r:id="rId29"/>
+    <p:sldId id="279" r:id="rId30"/>
+    <p:sldId id="281" r:id="rId31"/>
+    <p:sldId id="289" r:id="rId32"/>
+    <p:sldId id="285" r:id="rId33"/>
+    <p:sldId id="284" r:id="rId34"/>
+    <p:sldId id="286" r:id="rId35"/>
+    <p:sldId id="290" r:id="rId36"/>
+    <p:sldId id="291" r:id="rId37"/>
+    <p:sldId id="294" r:id="rId38"/>
+    <p:sldId id="265" r:id="rId39"/>
+    <p:sldId id="266" r:id="rId40"/>
   </p:sldIdLst>
   <p:sldSz cx="12192000" cy="6858000"/>
   <p:notesSz cx="6858000" cy="9144000"/>
@@ -141,13 +142,18 @@
       </a:defRPr>
     </a:lvl9pPr>
   </p:defaultTextStyle>
+  <p:extLst>
+    <p:ext uri="{EFAFB233-063F-42B5-8137-9DF3F51BA10A}">
+      <p15:sldGuideLst xmlns:p15="http://schemas.microsoft.com/office/powerpoint/2012/main"/>
+    </p:ext>
+  </p:extLst>
 </p:presentation>
 </file>
 
 <file path=ppt/revisionInfo.xml><?xml version="1.0" encoding="utf-8"?>
 <p1510:revInfo xmlns:a="http://schemas.openxmlformats.org/drawingml/2006/main" xmlns:r="http://schemas.openxmlformats.org/officeDocument/2006/relationships" xmlns:p1510="http://schemas.microsoft.com/office/powerpoint/2015/10/main">
   <p1510:revLst>
-    <p1510:client id="{20985C28-7607-43C0-B429-95D1502CBDD3}" v="239" dt="2024-01-19T18:59:14.535"/>
+    <p1510:client id="{20985C28-7607-43C0-B429-95D1502CBDD3}" v="241" dt="2024-01-27T17:36:54.920"/>
   </p1510:revLst>
 </p1510:revInfo>
 </file>
@@ -157,7 +163,7 @@
   <pc:docChgLst>
     <pc:chgData name="Shahbaz Chaudhary" userId="fef21e47db54da50" providerId="LiveId" clId="{20985C28-7607-43C0-B429-95D1502CBDD3}"/>
     <pc:docChg chg="undo custSel addSld delSld modSld sldOrd">
-      <pc:chgData name="Shahbaz Chaudhary" userId="fef21e47db54da50" providerId="LiveId" clId="{20985C28-7607-43C0-B429-95D1502CBDD3}" dt="2024-01-19T19:09:20.889" v="8824" actId="207"/>
+      <pc:chgData name="Shahbaz Chaudhary" userId="fef21e47db54da50" providerId="LiveId" clId="{20985C28-7607-43C0-B429-95D1502CBDD3}" dt="2024-01-27T18:05:39.568" v="9103" actId="2711"/>
       <pc:docMkLst>
         <pc:docMk/>
       </pc:docMkLst>
@@ -623,13 +629,13 @@
         </pc:cxnChg>
       </pc:sldChg>
       <pc:sldChg chg="addSp delSp modSp new mod">
-        <pc:chgData name="Shahbaz Chaudhary" userId="fef21e47db54da50" providerId="LiveId" clId="{20985C28-7607-43C0-B429-95D1502CBDD3}" dt="2024-01-17T20:32:00.160" v="3132" actId="1076"/>
+        <pc:chgData name="Shahbaz Chaudhary" userId="fef21e47db54da50" providerId="LiveId" clId="{20985C28-7607-43C0-B429-95D1502CBDD3}" dt="2024-01-23T04:21:51.441" v="8825" actId="20577"/>
         <pc:sldMkLst>
           <pc:docMk/>
           <pc:sldMk cId="3765577938" sldId="269"/>
         </pc:sldMkLst>
         <pc:spChg chg="mod">
-          <ac:chgData name="Shahbaz Chaudhary" userId="fef21e47db54da50" providerId="LiveId" clId="{20985C28-7607-43C0-B429-95D1502CBDD3}" dt="2024-01-17T20:20:08.971" v="2397" actId="20577"/>
+          <ac:chgData name="Shahbaz Chaudhary" userId="fef21e47db54da50" providerId="LiveId" clId="{20985C28-7607-43C0-B429-95D1502CBDD3}" dt="2024-01-23T04:21:51.441" v="8825" actId="20577"/>
           <ac:spMkLst>
             <pc:docMk/>
             <pc:sldMk cId="3765577938" sldId="269"/>
@@ -1095,11 +1101,27 @@
         </pc:picChg>
       </pc:sldChg>
       <pc:sldChg chg="addSp delSp modSp add mod">
-        <pc:chgData name="Shahbaz Chaudhary" userId="fef21e47db54da50" providerId="LiveId" clId="{20985C28-7607-43C0-B429-95D1502CBDD3}" dt="2024-01-17T22:11:04.855" v="5384" actId="20577"/>
+        <pc:chgData name="Shahbaz Chaudhary" userId="fef21e47db54da50" providerId="LiveId" clId="{20985C28-7607-43C0-B429-95D1502CBDD3}" dt="2024-01-27T15:59:05.763" v="9020" actId="14100"/>
         <pc:sldMkLst>
           <pc:docMk/>
           <pc:sldMk cId="3100109556" sldId="277"/>
         </pc:sldMkLst>
+        <pc:spChg chg="add mod">
+          <ac:chgData name="Shahbaz Chaudhary" userId="fef21e47db54da50" providerId="LiveId" clId="{20985C28-7607-43C0-B429-95D1502CBDD3}" dt="2024-01-27T15:59:05.763" v="9020" actId="14100"/>
+          <ac:spMkLst>
+            <pc:docMk/>
+            <pc:sldMk cId="3100109556" sldId="277"/>
+            <ac:spMk id="3" creationId="{1988E3C7-E0AC-2E2F-5603-95A7004F3F02}"/>
+          </ac:spMkLst>
+        </pc:spChg>
+        <pc:spChg chg="add del mod">
+          <ac:chgData name="Shahbaz Chaudhary" userId="fef21e47db54da50" providerId="LiveId" clId="{20985C28-7607-43C0-B429-95D1502CBDD3}" dt="2024-01-26T19:14:12.154" v="8917" actId="478"/>
+          <ac:spMkLst>
+            <pc:docMk/>
+            <pc:sldMk cId="3100109556" sldId="277"/>
+            <ac:spMk id="5" creationId="{688C6501-306E-8C12-F653-181F4B262807}"/>
+          </ac:spMkLst>
+        </pc:spChg>
         <pc:spChg chg="del">
           <ac:chgData name="Shahbaz Chaudhary" userId="fef21e47db54da50" providerId="LiveId" clId="{20985C28-7607-43C0-B429-95D1502CBDD3}" dt="2024-01-17T21:51:49.353" v="4852" actId="478"/>
           <ac:spMkLst>
@@ -1204,6 +1226,14 @@
             <ac:picMk id="12" creationId="{3E67E79D-AC8D-A8C0-D0A6-217437CB9C5B}"/>
           </ac:picMkLst>
         </pc:picChg>
+        <pc:cxnChg chg="add del mod">
+          <ac:chgData name="Shahbaz Chaudhary" userId="fef21e47db54da50" providerId="LiveId" clId="{20985C28-7607-43C0-B429-95D1502CBDD3}" dt="2024-01-26T19:14:12.154" v="8917" actId="478"/>
+          <ac:cxnSpMkLst>
+            <pc:docMk/>
+            <pc:sldMk cId="3100109556" sldId="277"/>
+            <ac:cxnSpMk id="4" creationId="{A9325C80-809E-3C36-5D76-A8991B507A5F}"/>
+          </ac:cxnSpMkLst>
+        </pc:cxnChg>
         <pc:cxnChg chg="add">
           <ac:chgData name="Shahbaz Chaudhary" userId="fef21e47db54da50" providerId="LiveId" clId="{20985C28-7607-43C0-B429-95D1502CBDD3}" dt="2024-01-17T21:56:57.045" v="4879" actId="11529"/>
           <ac:cxnSpMkLst>
@@ -1861,14 +1891,14 @@
           </ac:cxnSpMkLst>
         </pc:cxnChg>
       </pc:sldChg>
-      <pc:sldChg chg="modSp new mod">
-        <pc:chgData name="Shahbaz Chaudhary" userId="fef21e47db54da50" providerId="LiveId" clId="{20985C28-7607-43C0-B429-95D1502CBDD3}" dt="2024-01-19T19:09:20.889" v="8824" actId="207"/>
+      <pc:sldChg chg="addSp delSp modSp new mod">
+        <pc:chgData name="Shahbaz Chaudhary" userId="fef21e47db54da50" providerId="LiveId" clId="{20985C28-7607-43C0-B429-95D1502CBDD3}" dt="2024-01-27T18:05:39.568" v="9103" actId="2711"/>
         <pc:sldMkLst>
           <pc:docMk/>
           <pc:sldMk cId="579753958" sldId="294"/>
         </pc:sldMkLst>
         <pc:spChg chg="mod">
-          <ac:chgData name="Shahbaz Chaudhary" userId="fef21e47db54da50" providerId="LiveId" clId="{20985C28-7607-43C0-B429-95D1502CBDD3}" dt="2024-01-19T19:06:22.338" v="8801" actId="14100"/>
+          <ac:chgData name="Shahbaz Chaudhary" userId="fef21e47db54da50" providerId="LiveId" clId="{20985C28-7607-43C0-B429-95D1502CBDD3}" dt="2024-01-27T17:36:25.474" v="9053" actId="1035"/>
           <ac:spMkLst>
             <pc:docMk/>
             <pc:sldMk cId="579753958" sldId="294"/>
@@ -1876,13 +1906,52 @@
           </ac:spMkLst>
         </pc:spChg>
         <pc:spChg chg="mod">
-          <ac:chgData name="Shahbaz Chaudhary" userId="fef21e47db54da50" providerId="LiveId" clId="{20985C28-7607-43C0-B429-95D1502CBDD3}" dt="2024-01-19T19:09:20.889" v="8824" actId="207"/>
+          <ac:chgData name="Shahbaz Chaudhary" userId="fef21e47db54da50" providerId="LiveId" clId="{20985C28-7607-43C0-B429-95D1502CBDD3}" dt="2024-01-27T17:36:25.474" v="9053" actId="1035"/>
           <ac:spMkLst>
             <pc:docMk/>
             <pc:sldMk cId="579753958" sldId="294"/>
             <ac:spMk id="3" creationId="{7711FD63-F1FB-CC7D-C773-93F3E9FA319D}"/>
           </ac:spMkLst>
         </pc:spChg>
+        <pc:spChg chg="add mod">
+          <ac:chgData name="Shahbaz Chaudhary" userId="fef21e47db54da50" providerId="LiveId" clId="{20985C28-7607-43C0-B429-95D1502CBDD3}" dt="2024-01-27T18:05:39.568" v="9103" actId="2711"/>
+          <ac:spMkLst>
+            <pc:docMk/>
+            <pc:sldMk cId="579753958" sldId="294"/>
+            <ac:spMk id="5" creationId="{C3210A8B-F247-F599-A54C-6C0CA7FBF9FC}"/>
+          </ac:spMkLst>
+        </pc:spChg>
+        <pc:spChg chg="add del mod">
+          <ac:chgData name="Shahbaz Chaudhary" userId="fef21e47db54da50" providerId="LiveId" clId="{20985C28-7607-43C0-B429-95D1502CBDD3}" dt="2024-01-27T17:37:10.281" v="9069" actId="478"/>
+          <ac:spMkLst>
+            <pc:docMk/>
+            <pc:sldMk cId="579753958" sldId="294"/>
+            <ac:spMk id="6" creationId="{8AE12283-4A0B-D7B4-A61D-DA3468472D61}"/>
+          </ac:spMkLst>
+        </pc:spChg>
+      </pc:sldChg>
+      <pc:sldChg chg="addSp modSp new mod">
+        <pc:chgData name="Shahbaz Chaudhary" userId="fef21e47db54da50" providerId="LiveId" clId="{20985C28-7607-43C0-B429-95D1502CBDD3}" dt="2024-01-26T19:23:34.429" v="9019" actId="1076"/>
+        <pc:sldMkLst>
+          <pc:docMk/>
+          <pc:sldMk cId="793004113" sldId="295"/>
+        </pc:sldMkLst>
+        <pc:spChg chg="mod">
+          <ac:chgData name="Shahbaz Chaudhary" userId="fef21e47db54da50" providerId="LiveId" clId="{20985C28-7607-43C0-B429-95D1502CBDD3}" dt="2024-01-26T19:23:19.573" v="9014" actId="20577"/>
+          <ac:spMkLst>
+            <pc:docMk/>
+            <pc:sldMk cId="793004113" sldId="295"/>
+            <ac:spMk id="2" creationId="{3500C19D-790B-D761-AD26-AF91876AB299}"/>
+          </ac:spMkLst>
+        </pc:spChg>
+        <pc:picChg chg="add mod">
+          <ac:chgData name="Shahbaz Chaudhary" userId="fef21e47db54da50" providerId="LiveId" clId="{20985C28-7607-43C0-B429-95D1502CBDD3}" dt="2024-01-26T19:23:34.429" v="9019" actId="1076"/>
+          <ac:picMkLst>
+            <pc:docMk/>
+            <pc:sldMk cId="793004113" sldId="295"/>
+            <ac:picMk id="4" creationId="{A53C8E96-8FC1-F994-25B5-9F22DF417C40}"/>
+          </ac:picMkLst>
+        </pc:picChg>
       </pc:sldChg>
     </pc:docChg>
   </pc:docChgLst>
@@ -2062,7 +2131,7 @@
           <a:p>
             <a:fld id="{5892DAFE-CDAC-4B0E-AD8C-F5134B67DF4E}" type="datetimeFigureOut">
               <a:rPr lang="en-US" smtClean="0"/>
-              <a:t>1/17/2024</a:t>
+              <a:t>1/26/2024</a:t>
             </a:fld>
             <a:endParaRPr lang="en-US"/>
           </a:p>
@@ -2260,7 +2329,7 @@
           <a:p>
             <a:fld id="{5892DAFE-CDAC-4B0E-AD8C-F5134B67DF4E}" type="datetimeFigureOut">
               <a:rPr lang="en-US" smtClean="0"/>
-              <a:t>1/17/2024</a:t>
+              <a:t>1/26/2024</a:t>
             </a:fld>
             <a:endParaRPr lang="en-US"/>
           </a:p>
@@ -2468,7 +2537,7 @@
           <a:p>
             <a:fld id="{5892DAFE-CDAC-4B0E-AD8C-F5134B67DF4E}" type="datetimeFigureOut">
               <a:rPr lang="en-US" smtClean="0"/>
-              <a:t>1/17/2024</a:t>
+              <a:t>1/26/2024</a:t>
             </a:fld>
             <a:endParaRPr lang="en-US"/>
           </a:p>
@@ -2666,7 +2735,7 @@
           <a:p>
             <a:fld id="{5892DAFE-CDAC-4B0E-AD8C-F5134B67DF4E}" type="datetimeFigureOut">
               <a:rPr lang="en-US" smtClean="0"/>
-              <a:t>1/17/2024</a:t>
+              <a:t>1/26/2024</a:t>
             </a:fld>
             <a:endParaRPr lang="en-US"/>
           </a:p>
@@ -2941,7 +3010,7 @@
           <a:p>
             <a:fld id="{5892DAFE-CDAC-4B0E-AD8C-F5134B67DF4E}" type="datetimeFigureOut">
               <a:rPr lang="en-US" smtClean="0"/>
-              <a:t>1/17/2024</a:t>
+              <a:t>1/26/2024</a:t>
             </a:fld>
             <a:endParaRPr lang="en-US"/>
           </a:p>
@@ -3206,7 +3275,7 @@
           <a:p>
             <a:fld id="{5892DAFE-CDAC-4B0E-AD8C-F5134B67DF4E}" type="datetimeFigureOut">
               <a:rPr lang="en-US" smtClean="0"/>
-              <a:t>1/17/2024</a:t>
+              <a:t>1/26/2024</a:t>
             </a:fld>
             <a:endParaRPr lang="en-US"/>
           </a:p>
@@ -3618,7 +3687,7 @@
           <a:p>
             <a:fld id="{5892DAFE-CDAC-4B0E-AD8C-F5134B67DF4E}" type="datetimeFigureOut">
               <a:rPr lang="en-US" smtClean="0"/>
-              <a:t>1/17/2024</a:t>
+              <a:t>1/26/2024</a:t>
             </a:fld>
             <a:endParaRPr lang="en-US"/>
           </a:p>
@@ -3759,7 +3828,7 @@
           <a:p>
             <a:fld id="{5892DAFE-CDAC-4B0E-AD8C-F5134B67DF4E}" type="datetimeFigureOut">
               <a:rPr lang="en-US" smtClean="0"/>
-              <a:t>1/17/2024</a:t>
+              <a:t>1/26/2024</a:t>
             </a:fld>
             <a:endParaRPr lang="en-US"/>
           </a:p>
@@ -3872,7 +3941,7 @@
           <a:p>
             <a:fld id="{5892DAFE-CDAC-4B0E-AD8C-F5134B67DF4E}" type="datetimeFigureOut">
               <a:rPr lang="en-US" smtClean="0"/>
-              <a:t>1/17/2024</a:t>
+              <a:t>1/26/2024</a:t>
             </a:fld>
             <a:endParaRPr lang="en-US"/>
           </a:p>
@@ -4183,7 +4252,7 @@
           <a:p>
             <a:fld id="{5892DAFE-CDAC-4B0E-AD8C-F5134B67DF4E}" type="datetimeFigureOut">
               <a:rPr lang="en-US" smtClean="0"/>
-              <a:t>1/17/2024</a:t>
+              <a:t>1/26/2024</a:t>
             </a:fld>
             <a:endParaRPr lang="en-US"/>
           </a:p>
@@ -4471,7 +4540,7 @@
           <a:p>
             <a:fld id="{5892DAFE-CDAC-4B0E-AD8C-F5134B67DF4E}" type="datetimeFigureOut">
               <a:rPr lang="en-US" smtClean="0"/>
-              <a:t>1/17/2024</a:t>
+              <a:t>1/26/2024</a:t>
             </a:fld>
             <a:endParaRPr lang="en-US"/>
           </a:p>
@@ -4717,7 +4786,7 @@
           <a:p>
             <a:fld id="{5892DAFE-CDAC-4B0E-AD8C-F5134B67DF4E}" type="datetimeFigureOut">
               <a:rPr lang="en-US" smtClean="0"/>
-              <a:t>1/17/2024</a:t>
+              <a:t>1/26/2024</a:t>
             </a:fld>
             <a:endParaRPr lang="en-US"/>
           </a:p>
@@ -7333,7 +7402,15 @@
           <a:p>
             <a:r>
               <a:rPr lang="en-US" dirty="0"/>
-              <a:t>Web URLs contains lots of information</a:t>
+              <a:t>Web </a:t>
+            </a:r>
+            <a:r>
+              <a:rPr lang="en-US"/>
+              <a:t>URLs contain </a:t>
+            </a:r>
+            <a:r>
+              <a:rPr lang="en-US" dirty="0"/>
+              <a:t>lots of information</a:t>
             </a:r>
           </a:p>
         </p:txBody>
@@ -10118,6 +10195,56 @@
           </a:p>
         </p:txBody>
       </p:sp>
+      <p:sp>
+        <p:nvSpPr>
+          <p:cNvPr id="3" name="Arrow: Curved Right 2">
+            <a:extLst>
+              <a:ext uri="{FF2B5EF4-FFF2-40B4-BE49-F238E27FC236}">
+                <a16:creationId xmlns:a16="http://schemas.microsoft.com/office/drawing/2014/main" id="{1988E3C7-E0AC-2E2F-5603-95A7004F3F02}"/>
+              </a:ext>
+            </a:extLst>
+          </p:cNvPr>
+          <p:cNvSpPr/>
+          <p:nvPr/>
+        </p:nvSpPr>
+        <p:spPr>
+          <a:xfrm>
+            <a:off x="2396206" y="3091501"/>
+            <a:ext cx="334618" cy="2334806"/>
+          </a:xfrm>
+          <a:prstGeom prst="curvedRightArrow">
+            <a:avLst/>
+          </a:prstGeom>
+        </p:spPr>
+        <p:style>
+          <a:lnRef idx="2">
+            <a:schemeClr val="accent1">
+              <a:shade val="15000"/>
+            </a:schemeClr>
+          </a:lnRef>
+          <a:fillRef idx="1">
+            <a:schemeClr val="accent1"/>
+          </a:fillRef>
+          <a:effectRef idx="0">
+            <a:schemeClr val="accent1"/>
+          </a:effectRef>
+          <a:fontRef idx="minor">
+            <a:schemeClr val="lt1"/>
+          </a:fontRef>
+        </p:style>
+        <p:txBody>
+          <a:bodyPr rtlCol="0" anchor="ctr"/>
+          <a:lstStyle/>
+          <a:p>
+            <a:pPr algn="ctr"/>
+            <a:endParaRPr lang="en-US">
+              <a:solidFill>
+                <a:schemeClr val="tx1"/>
+              </a:solidFill>
+            </a:endParaRPr>
+          </a:p>
+        </p:txBody>
+      </p:sp>
     </p:spTree>
     <p:extLst>
       <p:ext uri="{BB962C8B-B14F-4D97-AF65-F5344CB8AC3E}">
@@ -13100,6 +13227,111 @@
           <p:cNvPr id="2" name="Title 1">
             <a:extLst>
               <a:ext uri="{FF2B5EF4-FFF2-40B4-BE49-F238E27FC236}">
+                <a16:creationId xmlns:a16="http://schemas.microsoft.com/office/drawing/2014/main" id="{3500C19D-790B-D761-AD26-AF91876AB299}"/>
+              </a:ext>
+            </a:extLst>
+          </p:cNvPr>
+          <p:cNvSpPr>
+            <a:spLocks noGrp="1"/>
+          </p:cNvSpPr>
+          <p:nvPr>
+            <p:ph type="title"/>
+          </p:nvPr>
+        </p:nvSpPr>
+        <p:spPr/>
+        <p:txBody>
+          <a:bodyPr>
+            <a:normAutofit fontScale="90000"/>
+          </a:bodyPr>
+          <a:lstStyle/>
+          <a:p>
+            <a:r>
+              <a:rPr lang="en-US" dirty="0"/>
+              <a:t>BTW: Common Crawl provides billions of web pages </a:t>
+            </a:r>
+            <a:r>
+              <a:rPr lang="en-US" i="1" dirty="0"/>
+              <a:t>and</a:t>
+            </a:r>
+            <a:r>
+              <a:rPr lang="en-US" dirty="0"/>
+              <a:t> the request/response headers</a:t>
+            </a:r>
+          </a:p>
+        </p:txBody>
+      </p:sp>
+      <p:pic>
+        <p:nvPicPr>
+          <p:cNvPr id="4" name="Picture 3">
+            <a:extLst>
+              <a:ext uri="{FF2B5EF4-FFF2-40B4-BE49-F238E27FC236}">
+                <a16:creationId xmlns:a16="http://schemas.microsoft.com/office/drawing/2014/main" id="{A53C8E96-8FC1-F994-25B5-9F22DF417C40}"/>
+              </a:ext>
+            </a:extLst>
+          </p:cNvPr>
+          <p:cNvPicPr>
+            <a:picLocks noChangeAspect="1"/>
+          </p:cNvPicPr>
+          <p:nvPr/>
+        </p:nvPicPr>
+        <p:blipFill>
+          <a:blip r:embed="rId2"/>
+          <a:stretch>
+            <a:fillRect/>
+          </a:stretch>
+        </p:blipFill>
+        <p:spPr>
+          <a:xfrm>
+            <a:off x="1209124" y="2100602"/>
+            <a:ext cx="9773752" cy="3831509"/>
+          </a:xfrm>
+          <a:prstGeom prst="rect">
+            <a:avLst/>
+          </a:prstGeom>
+          <a:effectLst>
+            <a:outerShdw blurRad="50800" dist="38100" dir="2700000" algn="tl" rotWithShape="0">
+              <a:prstClr val="black">
+                <a:alpha val="40000"/>
+              </a:prstClr>
+            </a:outerShdw>
+          </a:effectLst>
+        </p:spPr>
+      </p:pic>
+    </p:spTree>
+    <p:extLst>
+      <p:ext uri="{BB962C8B-B14F-4D97-AF65-F5344CB8AC3E}">
+        <p14:creationId xmlns:p14="http://schemas.microsoft.com/office/powerpoint/2010/main" val="793004113"/>
+      </p:ext>
+    </p:extLst>
+  </p:cSld>
+  <p:clrMapOvr>
+    <a:masterClrMapping/>
+  </p:clrMapOvr>
+</p:sld>
+</file>
+
+<file path=ppt/slides/slide23.xml><?xml version="1.0" encoding="utf-8"?>
+<p:sld xmlns:a="http://schemas.openxmlformats.org/drawingml/2006/main" xmlns:r="http://schemas.openxmlformats.org/officeDocument/2006/relationships" xmlns:p="http://schemas.openxmlformats.org/presentationml/2006/main">
+  <p:cSld>
+    <p:spTree>
+      <p:nvGrpSpPr>
+        <p:cNvPr id="1" name=""/>
+        <p:cNvGrpSpPr/>
+        <p:nvPr/>
+      </p:nvGrpSpPr>
+      <p:grpSpPr>
+        <a:xfrm>
+          <a:off x="0" y="0"/>
+          <a:ext cx="0" cy="0"/>
+          <a:chOff x="0" y="0"/>
+          <a:chExt cx="0" cy="0"/>
+        </a:xfrm>
+      </p:grpSpPr>
+      <p:sp>
+        <p:nvSpPr>
+          <p:cNvPr id="2" name="Title 1">
+            <a:extLst>
+              <a:ext uri="{FF2B5EF4-FFF2-40B4-BE49-F238E27FC236}">
                 <a16:creationId xmlns:a16="http://schemas.microsoft.com/office/drawing/2014/main" id="{82CDC8EB-1992-3CCE-B9A6-3FEB1E8A34CF}"/>
               </a:ext>
             </a:extLst>
@@ -14502,7 +14734,7 @@
 </p:sld>
 </file>
 
-<file path=ppt/slides/slide23.xml><?xml version="1.0" encoding="utf-8"?>
+<file path=ppt/slides/slide24.xml><?xml version="1.0" encoding="utf-8"?>
 <p:sld xmlns:a="http://schemas.openxmlformats.org/drawingml/2006/main" xmlns:r="http://schemas.openxmlformats.org/officeDocument/2006/relationships" xmlns:p="http://schemas.openxmlformats.org/presentationml/2006/main">
   <p:cSld>
     <p:spTree>
@@ -16177,7 +16409,7 @@
 </p:sld>
 </file>
 
-<file path=ppt/slides/slide24.xml><?xml version="1.0" encoding="utf-8"?>
+<file path=ppt/slides/slide25.xml><?xml version="1.0" encoding="utf-8"?>
 <p:sld xmlns:a="http://schemas.openxmlformats.org/drawingml/2006/main" xmlns:r="http://schemas.openxmlformats.org/officeDocument/2006/relationships" xmlns:p="http://schemas.openxmlformats.org/presentationml/2006/main">
   <p:cSld>
     <p:spTree>
@@ -16309,7 +16541,7 @@
 </p:sld>
 </file>
 
-<file path=ppt/slides/slide25.xml><?xml version="1.0" encoding="utf-8"?>
+<file path=ppt/slides/slide26.xml><?xml version="1.0" encoding="utf-8"?>
 <p:sld xmlns:a="http://schemas.openxmlformats.org/drawingml/2006/main" xmlns:r="http://schemas.openxmlformats.org/officeDocument/2006/relationships" xmlns:p="http://schemas.openxmlformats.org/presentationml/2006/main">
   <p:cSld>
     <p:spTree>
@@ -17027,7 +17259,7 @@
 </p:sld>
 </file>
 
-<file path=ppt/slides/slide26.xml><?xml version="1.0" encoding="utf-8"?>
+<file path=ppt/slides/slide27.xml><?xml version="1.0" encoding="utf-8"?>
 <p:sld xmlns:a="http://schemas.openxmlformats.org/drawingml/2006/main" xmlns:r="http://schemas.openxmlformats.org/officeDocument/2006/relationships" xmlns:p="http://schemas.openxmlformats.org/presentationml/2006/main">
   <p:cSld>
     <p:spTree>
@@ -17577,7 +17809,7 @@
 </p:sld>
 </file>
 
-<file path=ppt/slides/slide27.xml><?xml version="1.0" encoding="utf-8"?>
+<file path=ppt/slides/slide28.xml><?xml version="1.0" encoding="utf-8"?>
 <p:sld xmlns:a="http://schemas.openxmlformats.org/drawingml/2006/main" xmlns:r="http://schemas.openxmlformats.org/officeDocument/2006/relationships" xmlns:p="http://schemas.openxmlformats.org/presentationml/2006/main">
   <p:cSld>
     <p:spTree>
@@ -17660,7 +17892,7 @@
 </p:sld>
 </file>
 
-<file path=ppt/slides/slide28.xml><?xml version="1.0" encoding="utf-8"?>
+<file path=ppt/slides/slide29.xml><?xml version="1.0" encoding="utf-8"?>
 <p:sld xmlns:a="http://schemas.openxmlformats.org/drawingml/2006/main" xmlns:r="http://schemas.openxmlformats.org/officeDocument/2006/relationships" xmlns:p="http://schemas.openxmlformats.org/presentationml/2006/main">
   <p:cSld>
     <p:spTree>
@@ -17806,523 +18038,6 @@
     <p:extLst>
       <p:ext uri="{BB962C8B-B14F-4D97-AF65-F5344CB8AC3E}">
         <p14:creationId xmlns:p14="http://schemas.microsoft.com/office/powerpoint/2010/main" val="1907855191"/>
-      </p:ext>
-    </p:extLst>
-  </p:cSld>
-  <p:clrMapOvr>
-    <a:masterClrMapping/>
-  </p:clrMapOvr>
-</p:sld>
-</file>
-
-<file path=ppt/slides/slide29.xml><?xml version="1.0" encoding="utf-8"?>
-<p:sld xmlns:a="http://schemas.openxmlformats.org/drawingml/2006/main" xmlns:r="http://schemas.openxmlformats.org/officeDocument/2006/relationships" xmlns:p="http://schemas.openxmlformats.org/presentationml/2006/main">
-  <p:cSld>
-    <p:spTree>
-      <p:nvGrpSpPr>
-        <p:cNvPr id="1" name=""/>
-        <p:cNvGrpSpPr/>
-        <p:nvPr/>
-      </p:nvGrpSpPr>
-      <p:grpSpPr>
-        <a:xfrm>
-          <a:off x="0" y="0"/>
-          <a:ext cx="0" cy="0"/>
-          <a:chOff x="0" y="0"/>
-          <a:chExt cx="0" cy="0"/>
-        </a:xfrm>
-      </p:grpSpPr>
-      <p:sp>
-        <p:nvSpPr>
-          <p:cNvPr id="2" name="Title 1">
-            <a:extLst>
-              <a:ext uri="{FF2B5EF4-FFF2-40B4-BE49-F238E27FC236}">
-                <a16:creationId xmlns:a16="http://schemas.microsoft.com/office/drawing/2014/main" id="{EF72CA72-DA98-6FE0-2F18-D95CF320C69F}"/>
-              </a:ext>
-            </a:extLst>
-          </p:cNvPr>
-          <p:cNvSpPr>
-            <a:spLocks noGrp="1"/>
-          </p:cNvSpPr>
-          <p:nvPr>
-            <p:ph type="title"/>
-          </p:nvPr>
-        </p:nvSpPr>
-        <p:spPr/>
-        <p:txBody>
-          <a:bodyPr/>
-          <a:lstStyle/>
-          <a:p>
-            <a:r>
-              <a:rPr lang="en-US" dirty="0"/>
-              <a:t>Practically every language has libraries for writing http clients and servers</a:t>
-            </a:r>
-          </a:p>
-        </p:txBody>
-      </p:sp>
-      <p:sp>
-        <p:nvSpPr>
-          <p:cNvPr id="3" name="TextBox 2">
-            <a:extLst>
-              <a:ext uri="{FF2B5EF4-FFF2-40B4-BE49-F238E27FC236}">
-                <a16:creationId xmlns:a16="http://schemas.microsoft.com/office/drawing/2014/main" id="{11C34344-5886-D9C2-A578-5E975403F4FF}"/>
-              </a:ext>
-            </a:extLst>
-          </p:cNvPr>
-          <p:cNvSpPr txBox="1"/>
-          <p:nvPr/>
-        </p:nvSpPr>
-        <p:spPr>
-          <a:xfrm>
-            <a:off x="980502" y="2280492"/>
-            <a:ext cx="4847422" cy="646331"/>
-          </a:xfrm>
-          <a:prstGeom prst="rect">
-            <a:avLst/>
-          </a:prstGeom>
-          <a:noFill/>
-        </p:spPr>
-        <p:txBody>
-          <a:bodyPr wrap="square" rtlCol="0">
-            <a:spAutoFit/>
-          </a:bodyPr>
-          <a:lstStyle/>
-          <a:p>
-            <a:r>
-              <a:rPr lang="en-US" dirty="0">
-                <a:latin typeface="Georgia" panose="02040502050405020303" pitchFamily="18" charset="0"/>
-              </a:rPr>
-              <a:t>You can even use the command line to access a not so simple http resource:</a:t>
-            </a:r>
-          </a:p>
-        </p:txBody>
-      </p:sp>
-      <p:pic>
-        <p:nvPicPr>
-          <p:cNvPr id="6" name="Picture 5">
-            <a:extLst>
-              <a:ext uri="{FF2B5EF4-FFF2-40B4-BE49-F238E27FC236}">
-                <a16:creationId xmlns:a16="http://schemas.microsoft.com/office/drawing/2014/main" id="{4DBE23A0-42E6-BDA5-7EEB-6E7932077AC7}"/>
-              </a:ext>
-            </a:extLst>
-          </p:cNvPr>
-          <p:cNvPicPr>
-            <a:picLocks noChangeAspect="1"/>
-          </p:cNvPicPr>
-          <p:nvPr/>
-        </p:nvPicPr>
-        <p:blipFill>
-          <a:blip r:embed="rId2"/>
-          <a:stretch>
-            <a:fillRect/>
-          </a:stretch>
-        </p:blipFill>
-        <p:spPr>
-          <a:xfrm>
-            <a:off x="8273926" y="1690688"/>
-            <a:ext cx="3303311" cy="4558812"/>
-          </a:xfrm>
-          <a:prstGeom prst="rect">
-            <a:avLst/>
-          </a:prstGeom>
-          <a:effectLst>
-            <a:outerShdw blurRad="50800" dist="38100" dir="2700000" algn="tl" rotWithShape="0">
-              <a:prstClr val="black">
-                <a:alpha val="40000"/>
-              </a:prstClr>
-            </a:outerShdw>
-          </a:effectLst>
-        </p:spPr>
-      </p:pic>
-      <p:sp>
-        <p:nvSpPr>
-          <p:cNvPr id="8" name="TextBox 7">
-            <a:extLst>
-              <a:ext uri="{FF2B5EF4-FFF2-40B4-BE49-F238E27FC236}">
-                <a16:creationId xmlns:a16="http://schemas.microsoft.com/office/drawing/2014/main" id="{EFAFB0FA-6A0C-420A-DABE-35CFC3F770DD}"/>
-              </a:ext>
-            </a:extLst>
-          </p:cNvPr>
-          <p:cNvSpPr txBox="1"/>
-          <p:nvPr/>
-        </p:nvSpPr>
-        <p:spPr>
-          <a:xfrm>
-            <a:off x="980502" y="2926823"/>
-            <a:ext cx="7293424" cy="3785652"/>
-          </a:xfrm>
-          <a:prstGeom prst="rect">
-            <a:avLst/>
-          </a:prstGeom>
-          <a:noFill/>
-        </p:spPr>
-        <p:txBody>
-          <a:bodyPr wrap="square">
-            <a:spAutoFit/>
-          </a:bodyPr>
-          <a:lstStyle/>
-          <a:p>
-            <a:r>
-              <a:rPr lang="en-US" sz="1200" dirty="0">
-                <a:latin typeface="Consolas" panose="020B0609020204030204" pitchFamily="49" charset="0"/>
-              </a:rPr>
-              <a:t>curl "http://127.0.0.1:8080/.</a:t>
-            </a:r>
-            <a:r>
-              <a:rPr lang="en-US" sz="1200" dirty="0" err="1">
-                <a:latin typeface="Consolas" panose="020B0609020204030204" pitchFamily="49" charset="0"/>
-              </a:rPr>
-              <a:t>conda</a:t>
-            </a:r>
-            <a:r>
-              <a:rPr lang="en-US" sz="1200" dirty="0">
-                <a:latin typeface="Consolas" panose="020B0609020204030204" pitchFamily="49" charset="0"/>
-              </a:rPr>
-              <a:t>/" ^</a:t>
-            </a:r>
-          </a:p>
-          <a:p>
-            <a:r>
-              <a:rPr lang="en-US" sz="1200" dirty="0">
-                <a:latin typeface="Consolas" panose="020B0609020204030204" pitchFamily="49" charset="0"/>
-              </a:rPr>
-              <a:t>  -H "Accept: text/</a:t>
-            </a:r>
-            <a:r>
-              <a:rPr lang="en-US" sz="1200" dirty="0" err="1">
-                <a:latin typeface="Consolas" panose="020B0609020204030204" pitchFamily="49" charset="0"/>
-              </a:rPr>
-              <a:t>html,application</a:t>
-            </a:r>
-            <a:r>
-              <a:rPr lang="en-US" sz="1200" dirty="0">
-                <a:latin typeface="Consolas" panose="020B0609020204030204" pitchFamily="49" charset="0"/>
-              </a:rPr>
-              <a:t>/</a:t>
-            </a:r>
-            <a:r>
-              <a:rPr lang="en-US" sz="1200" dirty="0" err="1">
-                <a:latin typeface="Consolas" panose="020B0609020204030204" pitchFamily="49" charset="0"/>
-              </a:rPr>
-              <a:t>xhtml+xml,application</a:t>
-            </a:r>
-            <a:r>
-              <a:rPr lang="en-US" sz="1200" dirty="0">
-                <a:latin typeface="Consolas" panose="020B0609020204030204" pitchFamily="49" charset="0"/>
-              </a:rPr>
-              <a:t>/</a:t>
-            </a:r>
-            <a:r>
-              <a:rPr lang="en-US" sz="1200" dirty="0" err="1">
-                <a:latin typeface="Consolas" panose="020B0609020204030204" pitchFamily="49" charset="0"/>
-              </a:rPr>
-              <a:t>xml;q</a:t>
-            </a:r>
-            <a:r>
-              <a:rPr lang="en-US" sz="1200" dirty="0">
-                <a:latin typeface="Consolas" panose="020B0609020204030204" pitchFamily="49" charset="0"/>
-              </a:rPr>
-              <a:t>=0.9,image/</a:t>
-            </a:r>
-            <a:r>
-              <a:rPr lang="en-US" sz="1200" dirty="0" err="1">
-                <a:latin typeface="Consolas" panose="020B0609020204030204" pitchFamily="49" charset="0"/>
-              </a:rPr>
-              <a:t>avif,image</a:t>
-            </a:r>
-            <a:r>
-              <a:rPr lang="en-US" sz="1200" dirty="0">
-                <a:latin typeface="Consolas" panose="020B0609020204030204" pitchFamily="49" charset="0"/>
-              </a:rPr>
-              <a:t>/</a:t>
-            </a:r>
-            <a:r>
-              <a:rPr lang="en-US" sz="1200" dirty="0" err="1">
-                <a:latin typeface="Consolas" panose="020B0609020204030204" pitchFamily="49" charset="0"/>
-              </a:rPr>
-              <a:t>webp,image</a:t>
-            </a:r>
-            <a:r>
-              <a:rPr lang="en-US" sz="1200" dirty="0">
-                <a:latin typeface="Consolas" panose="020B0609020204030204" pitchFamily="49" charset="0"/>
-              </a:rPr>
-              <a:t>/</a:t>
-            </a:r>
-            <a:r>
-              <a:rPr lang="en-US" sz="1200" dirty="0" err="1">
-                <a:latin typeface="Consolas" panose="020B0609020204030204" pitchFamily="49" charset="0"/>
-              </a:rPr>
-              <a:t>apng</a:t>
-            </a:r>
-            <a:r>
-              <a:rPr lang="en-US" sz="1200" dirty="0">
-                <a:latin typeface="Consolas" panose="020B0609020204030204" pitchFamily="49" charset="0"/>
-              </a:rPr>
-              <a:t>,*/*;q=0.8,application/</a:t>
-            </a:r>
-            <a:r>
-              <a:rPr lang="en-US" sz="1200" dirty="0" err="1">
-                <a:latin typeface="Consolas" panose="020B0609020204030204" pitchFamily="49" charset="0"/>
-              </a:rPr>
-              <a:t>signed-exchange;v</a:t>
-            </a:r>
-            <a:r>
-              <a:rPr lang="en-US" sz="1200" dirty="0">
-                <a:latin typeface="Consolas" panose="020B0609020204030204" pitchFamily="49" charset="0"/>
-              </a:rPr>
-              <a:t>=b3;q=0.7" ^</a:t>
-            </a:r>
-          </a:p>
-          <a:p>
-            <a:r>
-              <a:rPr lang="en-US" sz="1200" dirty="0">
-                <a:latin typeface="Consolas" panose="020B0609020204030204" pitchFamily="49" charset="0"/>
-              </a:rPr>
-              <a:t>  -H "Accept-Language: </a:t>
-            </a:r>
-            <a:r>
-              <a:rPr lang="en-US" sz="1200" dirty="0" err="1">
-                <a:latin typeface="Consolas" panose="020B0609020204030204" pitchFamily="49" charset="0"/>
-              </a:rPr>
-              <a:t>en-US,en;q</a:t>
-            </a:r>
-            <a:r>
-              <a:rPr lang="en-US" sz="1200" dirty="0">
-                <a:latin typeface="Consolas" panose="020B0609020204030204" pitchFamily="49" charset="0"/>
-              </a:rPr>
-              <a:t>=0.9" ^</a:t>
-            </a:r>
-          </a:p>
-          <a:p>
-            <a:r>
-              <a:rPr lang="en-US" sz="1200" dirty="0">
-                <a:latin typeface="Consolas" panose="020B0609020204030204" pitchFamily="49" charset="0"/>
-              </a:rPr>
-              <a:t>  -H "Cache-Control: max-age=0" ^</a:t>
-            </a:r>
-          </a:p>
-          <a:p>
-            <a:r>
-              <a:rPr lang="en-US" sz="1200" dirty="0">
-                <a:latin typeface="Consolas" panose="020B0609020204030204" pitchFamily="49" charset="0"/>
-              </a:rPr>
-              <a:t>  -H "Connection: keep-alive" ^</a:t>
-            </a:r>
-          </a:p>
-          <a:p>
-            <a:r>
-              <a:rPr lang="en-US" sz="1200" dirty="0">
-                <a:latin typeface="Consolas" panose="020B0609020204030204" pitchFamily="49" charset="0"/>
-              </a:rPr>
-              <a:t>  -H "</a:t>
-            </a:r>
-            <a:r>
-              <a:rPr lang="en-US" sz="1200" dirty="0" err="1">
-                <a:latin typeface="Consolas" panose="020B0609020204030204" pitchFamily="49" charset="0"/>
-              </a:rPr>
-              <a:t>Referer</a:t>
-            </a:r>
-            <a:r>
-              <a:rPr lang="en-US" sz="1200" dirty="0">
-                <a:latin typeface="Consolas" panose="020B0609020204030204" pitchFamily="49" charset="0"/>
-              </a:rPr>
-              <a:t>: http://127.0.0.1:8080/" ^</a:t>
-            </a:r>
-          </a:p>
-          <a:p>
-            <a:r>
-              <a:rPr lang="en-US" sz="1200" dirty="0">
-                <a:latin typeface="Consolas" panose="020B0609020204030204" pitchFamily="49" charset="0"/>
-              </a:rPr>
-              <a:t>  -H "Sec-Fetch-</a:t>
-            </a:r>
-            <a:r>
-              <a:rPr lang="en-US" sz="1200" dirty="0" err="1">
-                <a:latin typeface="Consolas" panose="020B0609020204030204" pitchFamily="49" charset="0"/>
-              </a:rPr>
-              <a:t>Dest</a:t>
-            </a:r>
-            <a:r>
-              <a:rPr lang="en-US" sz="1200" dirty="0">
-                <a:latin typeface="Consolas" panose="020B0609020204030204" pitchFamily="49" charset="0"/>
-              </a:rPr>
-              <a:t>: document" ^</a:t>
-            </a:r>
-          </a:p>
-          <a:p>
-            <a:r>
-              <a:rPr lang="en-US" sz="1200" dirty="0">
-                <a:latin typeface="Consolas" panose="020B0609020204030204" pitchFamily="49" charset="0"/>
-              </a:rPr>
-              <a:t>  -H "Sec-Fetch-Mode: navigate" ^</a:t>
-            </a:r>
-          </a:p>
-          <a:p>
-            <a:r>
-              <a:rPr lang="en-US" sz="1200" dirty="0">
-                <a:latin typeface="Consolas" panose="020B0609020204030204" pitchFamily="49" charset="0"/>
-              </a:rPr>
-              <a:t>  -H "Sec-Fetch-Site: same-origin" ^</a:t>
-            </a:r>
-          </a:p>
-          <a:p>
-            <a:r>
-              <a:rPr lang="en-US" sz="1200" dirty="0">
-                <a:latin typeface="Consolas" panose="020B0609020204030204" pitchFamily="49" charset="0"/>
-              </a:rPr>
-              <a:t>  -H "Sec-Fetch-User: ?1" ^</a:t>
-            </a:r>
-          </a:p>
-          <a:p>
-            <a:r>
-              <a:rPr lang="en-US" sz="1200" dirty="0">
-                <a:latin typeface="Consolas" panose="020B0609020204030204" pitchFamily="49" charset="0"/>
-              </a:rPr>
-              <a:t>  -H "Upgrade-Insecure-Requests: 1" ^</a:t>
-            </a:r>
-          </a:p>
-          <a:p>
-            <a:r>
-              <a:rPr lang="en-US" sz="1200" dirty="0">
-                <a:latin typeface="Consolas" panose="020B0609020204030204" pitchFamily="49" charset="0"/>
-              </a:rPr>
-              <a:t>  -H "User-Agent: Mozilla/5.0 (Windows NT 10.0; Win64; x64) </a:t>
-            </a:r>
-            <a:r>
-              <a:rPr lang="en-US" sz="1200" dirty="0" err="1">
-                <a:latin typeface="Consolas" panose="020B0609020204030204" pitchFamily="49" charset="0"/>
-              </a:rPr>
-              <a:t>AppleWebKit</a:t>
-            </a:r>
-            <a:r>
-              <a:rPr lang="en-US" sz="1200" dirty="0">
-                <a:latin typeface="Consolas" panose="020B0609020204030204" pitchFamily="49" charset="0"/>
-              </a:rPr>
-              <a:t>/537.36 (KHTML, like Gecko) Chrome/120.0.0.0 Safari/537.36" ^</a:t>
-            </a:r>
-          </a:p>
-          <a:p>
-            <a:r>
-              <a:rPr lang="en-US" sz="1200" dirty="0">
-                <a:latin typeface="Consolas" panose="020B0609020204030204" pitchFamily="49" charset="0"/>
-              </a:rPr>
-              <a:t>  -H "sec-</a:t>
-            </a:r>
-            <a:r>
-              <a:rPr lang="en-US" sz="1200" dirty="0" err="1">
-                <a:latin typeface="Consolas" panose="020B0609020204030204" pitchFamily="49" charset="0"/>
-              </a:rPr>
-              <a:t>ch</a:t>
-            </a:r>
-            <a:r>
-              <a:rPr lang="en-US" sz="1200" dirty="0">
-                <a:latin typeface="Consolas" panose="020B0609020204030204" pitchFamily="49" charset="0"/>
-              </a:rPr>
-              <a:t>-</a:t>
-            </a:r>
-            <a:r>
-              <a:rPr lang="en-US" sz="1200" dirty="0" err="1">
-                <a:latin typeface="Consolas" panose="020B0609020204030204" pitchFamily="49" charset="0"/>
-              </a:rPr>
-              <a:t>ua</a:t>
-            </a:r>
-            <a:r>
-              <a:rPr lang="en-US" sz="1200" dirty="0">
-                <a:latin typeface="Consolas" panose="020B0609020204030204" pitchFamily="49" charset="0"/>
-              </a:rPr>
-              <a:t>: ^\^"</a:t>
-            </a:r>
-            <a:r>
-              <a:rPr lang="en-US" sz="1200" dirty="0" err="1">
-                <a:latin typeface="Consolas" panose="020B0609020204030204" pitchFamily="49" charset="0"/>
-              </a:rPr>
-              <a:t>Not_A</a:t>
-            </a:r>
-            <a:r>
-              <a:rPr lang="en-US" sz="1200" dirty="0">
-                <a:latin typeface="Consolas" panose="020B0609020204030204" pitchFamily="49" charset="0"/>
-              </a:rPr>
-              <a:t> Brand^\^";v=^\^"8^\^", ^\^"Chromium^\^";v=^\^"120^\^", ^\^"Google Chrome^\^";v=^\^"120^\^"" ^</a:t>
-            </a:r>
-          </a:p>
-          <a:p>
-            <a:r>
-              <a:rPr lang="en-US" sz="1200" dirty="0">
-                <a:latin typeface="Consolas" panose="020B0609020204030204" pitchFamily="49" charset="0"/>
-              </a:rPr>
-              <a:t>  -H "sec-</a:t>
-            </a:r>
-            <a:r>
-              <a:rPr lang="en-US" sz="1200" dirty="0" err="1">
-                <a:latin typeface="Consolas" panose="020B0609020204030204" pitchFamily="49" charset="0"/>
-              </a:rPr>
-              <a:t>ch</a:t>
-            </a:r>
-            <a:r>
-              <a:rPr lang="en-US" sz="1200" dirty="0">
-                <a:latin typeface="Consolas" panose="020B0609020204030204" pitchFamily="49" charset="0"/>
-              </a:rPr>
-              <a:t>-</a:t>
-            </a:r>
-            <a:r>
-              <a:rPr lang="en-US" sz="1200" dirty="0" err="1">
-                <a:latin typeface="Consolas" panose="020B0609020204030204" pitchFamily="49" charset="0"/>
-              </a:rPr>
-              <a:t>ua</a:t>
-            </a:r>
-            <a:r>
-              <a:rPr lang="en-US" sz="1200" dirty="0">
-                <a:latin typeface="Consolas" panose="020B0609020204030204" pitchFamily="49" charset="0"/>
-              </a:rPr>
-              <a:t>-mobile: ?0" ^</a:t>
-            </a:r>
-          </a:p>
-          <a:p>
-            <a:r>
-              <a:rPr lang="en-US" sz="1200" dirty="0">
-                <a:latin typeface="Consolas" panose="020B0609020204030204" pitchFamily="49" charset="0"/>
-              </a:rPr>
-              <a:t>  -H "sec-</a:t>
-            </a:r>
-            <a:r>
-              <a:rPr lang="en-US" sz="1200" dirty="0" err="1">
-                <a:latin typeface="Consolas" panose="020B0609020204030204" pitchFamily="49" charset="0"/>
-              </a:rPr>
-              <a:t>ch</a:t>
-            </a:r>
-            <a:r>
-              <a:rPr lang="en-US" sz="1200" dirty="0">
-                <a:latin typeface="Consolas" panose="020B0609020204030204" pitchFamily="49" charset="0"/>
-              </a:rPr>
-              <a:t>-</a:t>
-            </a:r>
-            <a:r>
-              <a:rPr lang="en-US" sz="1200" dirty="0" err="1">
-                <a:latin typeface="Consolas" panose="020B0609020204030204" pitchFamily="49" charset="0"/>
-              </a:rPr>
-              <a:t>ua</a:t>
-            </a:r>
-            <a:r>
-              <a:rPr lang="en-US" sz="1200" dirty="0">
-                <a:latin typeface="Consolas" panose="020B0609020204030204" pitchFamily="49" charset="0"/>
-              </a:rPr>
-              <a:t>-platform: ^\^"Windows^\^"" ^</a:t>
-            </a:r>
-          </a:p>
-          <a:p>
-            <a:r>
-              <a:rPr lang="en-US" sz="1200" dirty="0">
-                <a:latin typeface="Consolas" panose="020B0609020204030204" pitchFamily="49" charset="0"/>
-              </a:rPr>
-              <a:t>  --compressed</a:t>
-            </a:r>
-          </a:p>
-        </p:txBody>
-      </p:sp>
-    </p:spTree>
-    <p:extLst>
-      <p:ext uri="{BB962C8B-B14F-4D97-AF65-F5344CB8AC3E}">
-        <p14:creationId xmlns:p14="http://schemas.microsoft.com/office/powerpoint/2010/main" val="4226127547"/>
       </p:ext>
     </p:extLst>
   </p:cSld>
@@ -18935,7 +18650,7 @@
           <p:cNvPr id="2" name="Title 1">
             <a:extLst>
               <a:ext uri="{FF2B5EF4-FFF2-40B4-BE49-F238E27FC236}">
-                <a16:creationId xmlns:a16="http://schemas.microsoft.com/office/drawing/2014/main" id="{0E2EFFAF-1A2D-E0FD-E989-BCA4252319F6}"/>
+                <a16:creationId xmlns:a16="http://schemas.microsoft.com/office/drawing/2014/main" id="{EF72CA72-DA98-6FE0-2F18-D95CF320C69F}"/>
               </a:ext>
             </a:extLst>
           </p:cNvPr>
@@ -18952,12 +18667,8 @@
           <a:lstStyle/>
           <a:p>
             <a:r>
-              <a:rPr lang="en-US" dirty="0" err="1"/>
-              <a:t>cURL</a:t>
-            </a:r>
-            <a:r>
               <a:rPr lang="en-US" dirty="0"/>
-              <a:t> is an extremely versatile tool</a:t>
+              <a:t>Practically every language has libraries for writing http clients and servers</a:t>
             </a:r>
           </a:p>
         </p:txBody>
@@ -18967,7 +18678,7 @@
           <p:cNvPr id="3" name="TextBox 2">
             <a:extLst>
               <a:ext uri="{FF2B5EF4-FFF2-40B4-BE49-F238E27FC236}">
-                <a16:creationId xmlns:a16="http://schemas.microsoft.com/office/drawing/2014/main" id="{661FB449-0556-92D6-BCC1-5D83D3BD292D}"/>
+                <a16:creationId xmlns:a16="http://schemas.microsoft.com/office/drawing/2014/main" id="{11C34344-5886-D9C2-A578-5E975403F4FF}"/>
               </a:ext>
             </a:extLst>
           </p:cNvPr>
@@ -18976,8 +18687,8 @@
         </p:nvSpPr>
         <p:spPr>
           <a:xfrm>
-            <a:off x="575935" y="2335575"/>
-            <a:ext cx="9777035" cy="3170099"/>
+            <a:off x="980502" y="2280492"/>
+            <a:ext cx="4847422" cy="646331"/>
           </a:xfrm>
           <a:prstGeom prst="rect">
             <a:avLst/>
@@ -18985,260 +18696,446 @@
           <a:noFill/>
         </p:spPr>
         <p:txBody>
-          <a:bodyPr wrap="none" rtlCol="0">
+          <a:bodyPr wrap="square" rtlCol="0">
             <a:spAutoFit/>
           </a:bodyPr>
           <a:lstStyle/>
           <a:p>
             <a:r>
-              <a:rPr lang="en-US" sz="2000" dirty="0">
-                <a:solidFill>
-                  <a:schemeClr val="tx1">
-                    <a:lumMod val="75000"/>
-                    <a:lumOff val="25000"/>
-                  </a:schemeClr>
-                </a:solidFill>
+              <a:rPr lang="en-US" dirty="0">
                 <a:latin typeface="Georgia" panose="02040502050405020303" pitchFamily="18" charset="0"/>
               </a:rPr>
-              <a:t>Normal </a:t>
-            </a:r>
-            <a:r>
-              <a:rPr lang="en-US" sz="2000" dirty="0">
-                <a:solidFill>
-                  <a:schemeClr val="tx1">
-                    <a:lumMod val="75000"/>
-                    <a:lumOff val="25000"/>
-                  </a:schemeClr>
-                </a:solidFill>
-                <a:latin typeface="Consolas" panose="020B0609020204030204" pitchFamily="49" charset="0"/>
-              </a:rPr>
-              <a:t>GET</a:t>
-            </a:r>
-            <a:r>
-              <a:rPr lang="en-US" sz="2000" dirty="0">
-                <a:solidFill>
-                  <a:schemeClr val="tx1">
-                    <a:lumMod val="75000"/>
-                    <a:lumOff val="25000"/>
-                  </a:schemeClr>
-                </a:solidFill>
-                <a:latin typeface="Georgia" panose="02040502050405020303" pitchFamily="18" charset="0"/>
-              </a:rPr>
-              <a:t> request</a:t>
-            </a:r>
-          </a:p>
-          <a:p>
-            <a:r>
-              <a:rPr lang="en-US" sz="2000" dirty="0">
-                <a:solidFill>
-                  <a:schemeClr val="tx1">
-                    <a:lumMod val="75000"/>
-                    <a:lumOff val="25000"/>
-                  </a:schemeClr>
-                </a:solidFill>
-                <a:latin typeface="Consolas" panose="020B0609020204030204" pitchFamily="49" charset="0"/>
-              </a:rPr>
-              <a:t>curl </a:t>
-            </a:r>
-            <a:r>
-              <a:rPr lang="en-US" sz="2000" dirty="0">
-                <a:solidFill>
-                  <a:schemeClr val="tx1">
-                    <a:lumMod val="75000"/>
-                    <a:lumOff val="25000"/>
-                  </a:schemeClr>
-                </a:solidFill>
-                <a:latin typeface="Consolas" panose="020B0609020204030204" pitchFamily="49" charset="0"/>
-                <a:hlinkClick r:id="rId2">
-                  <a:extLst>
-                    <a:ext uri="{A12FA001-AC4F-418D-AE19-62706E023703}">
-                      <ahyp:hlinkClr xmlns:ahyp="http://schemas.microsoft.com/office/drawing/2018/hyperlinkcolor" val="tx"/>
-                    </a:ext>
-                  </a:extLst>
-                </a:hlinkClick>
-              </a:rPr>
-              <a:t>http://somewebsite.com/some_resource</a:t>
-            </a:r>
-            <a:endParaRPr lang="en-US" sz="2000" dirty="0">
-              <a:solidFill>
-                <a:schemeClr val="tx1">
-                  <a:lumMod val="75000"/>
-                  <a:lumOff val="25000"/>
-                </a:schemeClr>
-              </a:solidFill>
-              <a:latin typeface="Consolas" panose="020B0609020204030204" pitchFamily="49" charset="0"/>
-            </a:endParaRPr>
-          </a:p>
-          <a:p>
-            <a:endParaRPr lang="en-US" sz="2000" dirty="0">
-              <a:solidFill>
-                <a:schemeClr val="tx1">
-                  <a:lumMod val="75000"/>
-                  <a:lumOff val="25000"/>
-                </a:schemeClr>
-              </a:solidFill>
-              <a:latin typeface="Georgia" panose="02040502050405020303" pitchFamily="18" charset="0"/>
-            </a:endParaRPr>
-          </a:p>
-          <a:p>
-            <a:endParaRPr lang="en-US" sz="2000" dirty="0">
-              <a:solidFill>
-                <a:schemeClr val="tx1">
-                  <a:lumMod val="75000"/>
-                  <a:lumOff val="25000"/>
-                </a:schemeClr>
-              </a:solidFill>
-              <a:latin typeface="Consolas" panose="020B0609020204030204" pitchFamily="49" charset="0"/>
-            </a:endParaRPr>
-          </a:p>
-          <a:p>
-            <a:r>
-              <a:rPr lang="en-US" sz="2000" dirty="0">
-                <a:solidFill>
-                  <a:schemeClr val="tx1">
-                    <a:lumMod val="75000"/>
-                    <a:lumOff val="25000"/>
-                  </a:schemeClr>
-                </a:solidFill>
-                <a:latin typeface="Consolas" panose="020B0609020204030204" pitchFamily="49" charset="0"/>
-              </a:rPr>
-              <a:t>POST</a:t>
-            </a:r>
-            <a:r>
-              <a:rPr lang="en-US" sz="2000" dirty="0">
-                <a:solidFill>
-                  <a:schemeClr val="tx1">
-                    <a:lumMod val="75000"/>
-                    <a:lumOff val="25000"/>
-                  </a:schemeClr>
-                </a:solidFill>
-                <a:latin typeface="Georgia" panose="02040502050405020303" pitchFamily="18" charset="0"/>
-              </a:rPr>
-              <a:t> request with a JSON payload</a:t>
-            </a:r>
-          </a:p>
-          <a:p>
-            <a:r>
-              <a:rPr lang="en-US" sz="2000" dirty="0">
-                <a:solidFill>
-                  <a:schemeClr val="tx1">
-                    <a:lumMod val="75000"/>
-                    <a:lumOff val="25000"/>
-                  </a:schemeClr>
-                </a:solidFill>
-                <a:latin typeface="Consolas" panose="020B0609020204030204" pitchFamily="49" charset="0"/>
-              </a:rPr>
-              <a:t>curl –X POST \</a:t>
-            </a:r>
-          </a:p>
-          <a:p>
-            <a:r>
-              <a:rPr lang="en-US" sz="2000" dirty="0">
-                <a:solidFill>
-                  <a:schemeClr val="tx1">
-                    <a:lumMod val="75000"/>
-                    <a:lumOff val="25000"/>
-                  </a:schemeClr>
-                </a:solidFill>
-                <a:latin typeface="Consolas" panose="020B0609020204030204" pitchFamily="49" charset="0"/>
-              </a:rPr>
-              <a:t>  –H “Content-Type: application/</a:t>
-            </a:r>
-            <a:r>
-              <a:rPr lang="en-US" sz="2000" dirty="0" err="1">
-                <a:solidFill>
-                  <a:schemeClr val="tx1">
-                    <a:lumMod val="75000"/>
-                    <a:lumOff val="25000"/>
-                  </a:schemeClr>
-                </a:solidFill>
-                <a:latin typeface="Consolas" panose="020B0609020204030204" pitchFamily="49" charset="0"/>
-              </a:rPr>
-              <a:t>json</a:t>
-            </a:r>
-            <a:r>
-              <a:rPr lang="en-US" sz="2000" dirty="0">
-                <a:solidFill>
-                  <a:schemeClr val="tx1">
-                    <a:lumMod val="75000"/>
-                    <a:lumOff val="25000"/>
-                  </a:schemeClr>
-                </a:solidFill>
-                <a:latin typeface="Consolas" panose="020B0609020204030204" pitchFamily="49" charset="0"/>
-              </a:rPr>
-              <a:t>” \</a:t>
-            </a:r>
-          </a:p>
-          <a:p>
-            <a:r>
-              <a:rPr lang="en-US" sz="2000" dirty="0">
-                <a:solidFill>
-                  <a:schemeClr val="tx1">
-                    <a:lumMod val="75000"/>
-                    <a:lumOff val="25000"/>
-                  </a:schemeClr>
-                </a:solidFill>
-                <a:latin typeface="Consolas" panose="020B0609020204030204" pitchFamily="49" charset="0"/>
-              </a:rPr>
-              <a:t>  –d “{param1:val, param2:val}” </a:t>
-            </a:r>
-            <a:r>
-              <a:rPr lang="en-US" sz="2000" dirty="0">
-                <a:solidFill>
-                  <a:schemeClr val="tx1">
-                    <a:lumMod val="75000"/>
-                    <a:lumOff val="25000"/>
-                  </a:schemeClr>
-                </a:solidFill>
-                <a:latin typeface="Consolas" panose="020B0609020204030204" pitchFamily="49" charset="0"/>
-                <a:hlinkClick r:id="rId2">
-                  <a:extLst>
-                    <a:ext uri="{A12FA001-AC4F-418D-AE19-62706E023703}">
-                      <ahyp:hlinkClr xmlns:ahyp="http://schemas.microsoft.com/office/drawing/2018/hyperlinkcolor" val="tx"/>
-                    </a:ext>
-                  </a:extLst>
-                </a:hlinkClick>
-              </a:rPr>
-              <a:t>http://somewebsite.com/some_resource</a:t>
-            </a:r>
-            <a:endParaRPr lang="en-US" sz="2000" dirty="0">
-              <a:solidFill>
-                <a:schemeClr val="tx1">
-                  <a:lumMod val="75000"/>
-                  <a:lumOff val="25000"/>
-                </a:schemeClr>
-              </a:solidFill>
-              <a:latin typeface="Consolas" panose="020B0609020204030204" pitchFamily="49" charset="0"/>
-            </a:endParaRPr>
-          </a:p>
-          <a:p>
-            <a:endParaRPr lang="en-US" sz="2000" dirty="0">
-              <a:solidFill>
-                <a:schemeClr val="tx1">
-                  <a:lumMod val="75000"/>
-                  <a:lumOff val="25000"/>
-                </a:schemeClr>
-              </a:solidFill>
-              <a:latin typeface="Georgia" panose="02040502050405020303" pitchFamily="18" charset="0"/>
-            </a:endParaRPr>
-          </a:p>
-          <a:p>
-            <a:endParaRPr lang="en-US" sz="2000" dirty="0">
-              <a:solidFill>
-                <a:schemeClr val="tx1">
-                  <a:lumMod val="75000"/>
-                  <a:lumOff val="25000"/>
-                </a:schemeClr>
-              </a:solidFill>
-              <a:latin typeface="Georgia" panose="02040502050405020303" pitchFamily="18" charset="0"/>
-            </a:endParaRPr>
+              <a:t>You can even use the command line to access a not so simple http resource:</a:t>
+            </a:r>
+          </a:p>
+        </p:txBody>
+      </p:sp>
+      <p:pic>
+        <p:nvPicPr>
+          <p:cNvPr id="6" name="Picture 5">
+            <a:extLst>
+              <a:ext uri="{FF2B5EF4-FFF2-40B4-BE49-F238E27FC236}">
+                <a16:creationId xmlns:a16="http://schemas.microsoft.com/office/drawing/2014/main" id="{4DBE23A0-42E6-BDA5-7EEB-6E7932077AC7}"/>
+              </a:ext>
+            </a:extLst>
+          </p:cNvPr>
+          <p:cNvPicPr>
+            <a:picLocks noChangeAspect="1"/>
+          </p:cNvPicPr>
+          <p:nvPr/>
+        </p:nvPicPr>
+        <p:blipFill>
+          <a:blip r:embed="rId2"/>
+          <a:stretch>
+            <a:fillRect/>
+          </a:stretch>
+        </p:blipFill>
+        <p:spPr>
+          <a:xfrm>
+            <a:off x="8273926" y="1690688"/>
+            <a:ext cx="3303311" cy="4558812"/>
+          </a:xfrm>
+          <a:prstGeom prst="rect">
+            <a:avLst/>
+          </a:prstGeom>
+          <a:effectLst>
+            <a:outerShdw blurRad="50800" dist="38100" dir="2700000" algn="tl" rotWithShape="0">
+              <a:prstClr val="black">
+                <a:alpha val="40000"/>
+              </a:prstClr>
+            </a:outerShdw>
+          </a:effectLst>
+        </p:spPr>
+      </p:pic>
+      <p:sp>
+        <p:nvSpPr>
+          <p:cNvPr id="8" name="TextBox 7">
+            <a:extLst>
+              <a:ext uri="{FF2B5EF4-FFF2-40B4-BE49-F238E27FC236}">
+                <a16:creationId xmlns:a16="http://schemas.microsoft.com/office/drawing/2014/main" id="{EFAFB0FA-6A0C-420A-DABE-35CFC3F770DD}"/>
+              </a:ext>
+            </a:extLst>
+          </p:cNvPr>
+          <p:cNvSpPr txBox="1"/>
+          <p:nvPr/>
+        </p:nvSpPr>
+        <p:spPr>
+          <a:xfrm>
+            <a:off x="980502" y="2926823"/>
+            <a:ext cx="7293424" cy="3785652"/>
+          </a:xfrm>
+          <a:prstGeom prst="rect">
+            <a:avLst/>
+          </a:prstGeom>
+          <a:noFill/>
+        </p:spPr>
+        <p:txBody>
+          <a:bodyPr wrap="square">
+            <a:spAutoFit/>
+          </a:bodyPr>
+          <a:lstStyle/>
+          <a:p>
+            <a:r>
+              <a:rPr lang="en-US" sz="1200" dirty="0">
+                <a:latin typeface="Consolas" panose="020B0609020204030204" pitchFamily="49" charset="0"/>
+              </a:rPr>
+              <a:t>curl "http://127.0.0.1:8080/.</a:t>
+            </a:r>
+            <a:r>
+              <a:rPr lang="en-US" sz="1200" dirty="0" err="1">
+                <a:latin typeface="Consolas" panose="020B0609020204030204" pitchFamily="49" charset="0"/>
+              </a:rPr>
+              <a:t>conda</a:t>
+            </a:r>
+            <a:r>
+              <a:rPr lang="en-US" sz="1200" dirty="0">
+                <a:latin typeface="Consolas" panose="020B0609020204030204" pitchFamily="49" charset="0"/>
+              </a:rPr>
+              <a:t>/" ^</a:t>
+            </a:r>
+          </a:p>
+          <a:p>
+            <a:r>
+              <a:rPr lang="en-US" sz="1200" dirty="0">
+                <a:latin typeface="Consolas" panose="020B0609020204030204" pitchFamily="49" charset="0"/>
+              </a:rPr>
+              <a:t>  -H "Accept: text/</a:t>
+            </a:r>
+            <a:r>
+              <a:rPr lang="en-US" sz="1200" dirty="0" err="1">
+                <a:latin typeface="Consolas" panose="020B0609020204030204" pitchFamily="49" charset="0"/>
+              </a:rPr>
+              <a:t>html,application</a:t>
+            </a:r>
+            <a:r>
+              <a:rPr lang="en-US" sz="1200" dirty="0">
+                <a:latin typeface="Consolas" panose="020B0609020204030204" pitchFamily="49" charset="0"/>
+              </a:rPr>
+              <a:t>/</a:t>
+            </a:r>
+            <a:r>
+              <a:rPr lang="en-US" sz="1200" dirty="0" err="1">
+                <a:latin typeface="Consolas" panose="020B0609020204030204" pitchFamily="49" charset="0"/>
+              </a:rPr>
+              <a:t>xhtml+xml,application</a:t>
+            </a:r>
+            <a:r>
+              <a:rPr lang="en-US" sz="1200" dirty="0">
+                <a:latin typeface="Consolas" panose="020B0609020204030204" pitchFamily="49" charset="0"/>
+              </a:rPr>
+              <a:t>/</a:t>
+            </a:r>
+            <a:r>
+              <a:rPr lang="en-US" sz="1200" dirty="0" err="1">
+                <a:latin typeface="Consolas" panose="020B0609020204030204" pitchFamily="49" charset="0"/>
+              </a:rPr>
+              <a:t>xml;q</a:t>
+            </a:r>
+            <a:r>
+              <a:rPr lang="en-US" sz="1200" dirty="0">
+                <a:latin typeface="Consolas" panose="020B0609020204030204" pitchFamily="49" charset="0"/>
+              </a:rPr>
+              <a:t>=0.9,image/</a:t>
+            </a:r>
+            <a:r>
+              <a:rPr lang="en-US" sz="1200" dirty="0" err="1">
+                <a:latin typeface="Consolas" panose="020B0609020204030204" pitchFamily="49" charset="0"/>
+              </a:rPr>
+              <a:t>avif,image</a:t>
+            </a:r>
+            <a:r>
+              <a:rPr lang="en-US" sz="1200" dirty="0">
+                <a:latin typeface="Consolas" panose="020B0609020204030204" pitchFamily="49" charset="0"/>
+              </a:rPr>
+              <a:t>/</a:t>
+            </a:r>
+            <a:r>
+              <a:rPr lang="en-US" sz="1200" dirty="0" err="1">
+                <a:latin typeface="Consolas" panose="020B0609020204030204" pitchFamily="49" charset="0"/>
+              </a:rPr>
+              <a:t>webp,image</a:t>
+            </a:r>
+            <a:r>
+              <a:rPr lang="en-US" sz="1200" dirty="0">
+                <a:latin typeface="Consolas" panose="020B0609020204030204" pitchFamily="49" charset="0"/>
+              </a:rPr>
+              <a:t>/</a:t>
+            </a:r>
+            <a:r>
+              <a:rPr lang="en-US" sz="1200" dirty="0" err="1">
+                <a:latin typeface="Consolas" panose="020B0609020204030204" pitchFamily="49" charset="0"/>
+              </a:rPr>
+              <a:t>apng</a:t>
+            </a:r>
+            <a:r>
+              <a:rPr lang="en-US" sz="1200" dirty="0">
+                <a:latin typeface="Consolas" panose="020B0609020204030204" pitchFamily="49" charset="0"/>
+              </a:rPr>
+              <a:t>,*/*;q=0.8,application/</a:t>
+            </a:r>
+            <a:r>
+              <a:rPr lang="en-US" sz="1200" dirty="0" err="1">
+                <a:latin typeface="Consolas" panose="020B0609020204030204" pitchFamily="49" charset="0"/>
+              </a:rPr>
+              <a:t>signed-exchange;v</a:t>
+            </a:r>
+            <a:r>
+              <a:rPr lang="en-US" sz="1200" dirty="0">
+                <a:latin typeface="Consolas" panose="020B0609020204030204" pitchFamily="49" charset="0"/>
+              </a:rPr>
+              <a:t>=b3;q=0.7" ^</a:t>
+            </a:r>
+          </a:p>
+          <a:p>
+            <a:r>
+              <a:rPr lang="en-US" sz="1200" dirty="0">
+                <a:latin typeface="Consolas" panose="020B0609020204030204" pitchFamily="49" charset="0"/>
+              </a:rPr>
+              <a:t>  -H "Accept-Language: </a:t>
+            </a:r>
+            <a:r>
+              <a:rPr lang="en-US" sz="1200" dirty="0" err="1">
+                <a:latin typeface="Consolas" panose="020B0609020204030204" pitchFamily="49" charset="0"/>
+              </a:rPr>
+              <a:t>en-US,en;q</a:t>
+            </a:r>
+            <a:r>
+              <a:rPr lang="en-US" sz="1200" dirty="0">
+                <a:latin typeface="Consolas" panose="020B0609020204030204" pitchFamily="49" charset="0"/>
+              </a:rPr>
+              <a:t>=0.9" ^</a:t>
+            </a:r>
+          </a:p>
+          <a:p>
+            <a:r>
+              <a:rPr lang="en-US" sz="1200" dirty="0">
+                <a:latin typeface="Consolas" panose="020B0609020204030204" pitchFamily="49" charset="0"/>
+              </a:rPr>
+              <a:t>  -H "Cache-Control: max-age=0" ^</a:t>
+            </a:r>
+          </a:p>
+          <a:p>
+            <a:r>
+              <a:rPr lang="en-US" sz="1200" dirty="0">
+                <a:latin typeface="Consolas" panose="020B0609020204030204" pitchFamily="49" charset="0"/>
+              </a:rPr>
+              <a:t>  -H "Connection: keep-alive" ^</a:t>
+            </a:r>
+          </a:p>
+          <a:p>
+            <a:r>
+              <a:rPr lang="en-US" sz="1200" dirty="0">
+                <a:latin typeface="Consolas" panose="020B0609020204030204" pitchFamily="49" charset="0"/>
+              </a:rPr>
+              <a:t>  -H "</a:t>
+            </a:r>
+            <a:r>
+              <a:rPr lang="en-US" sz="1200" dirty="0" err="1">
+                <a:latin typeface="Consolas" panose="020B0609020204030204" pitchFamily="49" charset="0"/>
+              </a:rPr>
+              <a:t>Referer</a:t>
+            </a:r>
+            <a:r>
+              <a:rPr lang="en-US" sz="1200" dirty="0">
+                <a:latin typeface="Consolas" panose="020B0609020204030204" pitchFamily="49" charset="0"/>
+              </a:rPr>
+              <a:t>: http://127.0.0.1:8080/" ^</a:t>
+            </a:r>
+          </a:p>
+          <a:p>
+            <a:r>
+              <a:rPr lang="en-US" sz="1200" dirty="0">
+                <a:latin typeface="Consolas" panose="020B0609020204030204" pitchFamily="49" charset="0"/>
+              </a:rPr>
+              <a:t>  -H "Sec-Fetch-</a:t>
+            </a:r>
+            <a:r>
+              <a:rPr lang="en-US" sz="1200" dirty="0" err="1">
+                <a:latin typeface="Consolas" panose="020B0609020204030204" pitchFamily="49" charset="0"/>
+              </a:rPr>
+              <a:t>Dest</a:t>
+            </a:r>
+            <a:r>
+              <a:rPr lang="en-US" sz="1200" dirty="0">
+                <a:latin typeface="Consolas" panose="020B0609020204030204" pitchFamily="49" charset="0"/>
+              </a:rPr>
+              <a:t>: document" ^</a:t>
+            </a:r>
+          </a:p>
+          <a:p>
+            <a:r>
+              <a:rPr lang="en-US" sz="1200" dirty="0">
+                <a:latin typeface="Consolas" panose="020B0609020204030204" pitchFamily="49" charset="0"/>
+              </a:rPr>
+              <a:t>  -H "Sec-Fetch-Mode: navigate" ^</a:t>
+            </a:r>
+          </a:p>
+          <a:p>
+            <a:r>
+              <a:rPr lang="en-US" sz="1200" dirty="0">
+                <a:latin typeface="Consolas" panose="020B0609020204030204" pitchFamily="49" charset="0"/>
+              </a:rPr>
+              <a:t>  -H "Sec-Fetch-Site: same-origin" ^</a:t>
+            </a:r>
+          </a:p>
+          <a:p>
+            <a:r>
+              <a:rPr lang="en-US" sz="1200" dirty="0">
+                <a:latin typeface="Consolas" panose="020B0609020204030204" pitchFamily="49" charset="0"/>
+              </a:rPr>
+              <a:t>  -H "Sec-Fetch-User: ?1" ^</a:t>
+            </a:r>
+          </a:p>
+          <a:p>
+            <a:r>
+              <a:rPr lang="en-US" sz="1200" dirty="0">
+                <a:latin typeface="Consolas" panose="020B0609020204030204" pitchFamily="49" charset="0"/>
+              </a:rPr>
+              <a:t>  -H "Upgrade-Insecure-Requests: 1" ^</a:t>
+            </a:r>
+          </a:p>
+          <a:p>
+            <a:r>
+              <a:rPr lang="en-US" sz="1200" dirty="0">
+                <a:latin typeface="Consolas" panose="020B0609020204030204" pitchFamily="49" charset="0"/>
+              </a:rPr>
+              <a:t>  -H "User-Agent: Mozilla/5.0 (Windows NT 10.0; Win64; x64) </a:t>
+            </a:r>
+            <a:r>
+              <a:rPr lang="en-US" sz="1200" dirty="0" err="1">
+                <a:latin typeface="Consolas" panose="020B0609020204030204" pitchFamily="49" charset="0"/>
+              </a:rPr>
+              <a:t>AppleWebKit</a:t>
+            </a:r>
+            <a:r>
+              <a:rPr lang="en-US" sz="1200" dirty="0">
+                <a:latin typeface="Consolas" panose="020B0609020204030204" pitchFamily="49" charset="0"/>
+              </a:rPr>
+              <a:t>/537.36 (KHTML, like Gecko) Chrome/120.0.0.0 Safari/537.36" ^</a:t>
+            </a:r>
+          </a:p>
+          <a:p>
+            <a:r>
+              <a:rPr lang="en-US" sz="1200" dirty="0">
+                <a:latin typeface="Consolas" panose="020B0609020204030204" pitchFamily="49" charset="0"/>
+              </a:rPr>
+              <a:t>  -H "sec-</a:t>
+            </a:r>
+            <a:r>
+              <a:rPr lang="en-US" sz="1200" dirty="0" err="1">
+                <a:latin typeface="Consolas" panose="020B0609020204030204" pitchFamily="49" charset="0"/>
+              </a:rPr>
+              <a:t>ch</a:t>
+            </a:r>
+            <a:r>
+              <a:rPr lang="en-US" sz="1200" dirty="0">
+                <a:latin typeface="Consolas" panose="020B0609020204030204" pitchFamily="49" charset="0"/>
+              </a:rPr>
+              <a:t>-</a:t>
+            </a:r>
+            <a:r>
+              <a:rPr lang="en-US" sz="1200" dirty="0" err="1">
+                <a:latin typeface="Consolas" panose="020B0609020204030204" pitchFamily="49" charset="0"/>
+              </a:rPr>
+              <a:t>ua</a:t>
+            </a:r>
+            <a:r>
+              <a:rPr lang="en-US" sz="1200" dirty="0">
+                <a:latin typeface="Consolas" panose="020B0609020204030204" pitchFamily="49" charset="0"/>
+              </a:rPr>
+              <a:t>: ^\^"</a:t>
+            </a:r>
+            <a:r>
+              <a:rPr lang="en-US" sz="1200" dirty="0" err="1">
+                <a:latin typeface="Consolas" panose="020B0609020204030204" pitchFamily="49" charset="0"/>
+              </a:rPr>
+              <a:t>Not_A</a:t>
+            </a:r>
+            <a:r>
+              <a:rPr lang="en-US" sz="1200" dirty="0">
+                <a:latin typeface="Consolas" panose="020B0609020204030204" pitchFamily="49" charset="0"/>
+              </a:rPr>
+              <a:t> Brand^\^";v=^\^"8^\^", ^\^"Chromium^\^";v=^\^"120^\^", ^\^"Google Chrome^\^";v=^\^"120^\^"" ^</a:t>
+            </a:r>
+          </a:p>
+          <a:p>
+            <a:r>
+              <a:rPr lang="en-US" sz="1200" dirty="0">
+                <a:latin typeface="Consolas" panose="020B0609020204030204" pitchFamily="49" charset="0"/>
+              </a:rPr>
+              <a:t>  -H "sec-</a:t>
+            </a:r>
+            <a:r>
+              <a:rPr lang="en-US" sz="1200" dirty="0" err="1">
+                <a:latin typeface="Consolas" panose="020B0609020204030204" pitchFamily="49" charset="0"/>
+              </a:rPr>
+              <a:t>ch</a:t>
+            </a:r>
+            <a:r>
+              <a:rPr lang="en-US" sz="1200" dirty="0">
+                <a:latin typeface="Consolas" panose="020B0609020204030204" pitchFamily="49" charset="0"/>
+              </a:rPr>
+              <a:t>-</a:t>
+            </a:r>
+            <a:r>
+              <a:rPr lang="en-US" sz="1200" dirty="0" err="1">
+                <a:latin typeface="Consolas" panose="020B0609020204030204" pitchFamily="49" charset="0"/>
+              </a:rPr>
+              <a:t>ua</a:t>
+            </a:r>
+            <a:r>
+              <a:rPr lang="en-US" sz="1200" dirty="0">
+                <a:latin typeface="Consolas" panose="020B0609020204030204" pitchFamily="49" charset="0"/>
+              </a:rPr>
+              <a:t>-mobile: ?0" ^</a:t>
+            </a:r>
+          </a:p>
+          <a:p>
+            <a:r>
+              <a:rPr lang="en-US" sz="1200" dirty="0">
+                <a:latin typeface="Consolas" panose="020B0609020204030204" pitchFamily="49" charset="0"/>
+              </a:rPr>
+              <a:t>  -H "sec-</a:t>
+            </a:r>
+            <a:r>
+              <a:rPr lang="en-US" sz="1200" dirty="0" err="1">
+                <a:latin typeface="Consolas" panose="020B0609020204030204" pitchFamily="49" charset="0"/>
+              </a:rPr>
+              <a:t>ch</a:t>
+            </a:r>
+            <a:r>
+              <a:rPr lang="en-US" sz="1200" dirty="0">
+                <a:latin typeface="Consolas" panose="020B0609020204030204" pitchFamily="49" charset="0"/>
+              </a:rPr>
+              <a:t>-</a:t>
+            </a:r>
+            <a:r>
+              <a:rPr lang="en-US" sz="1200" dirty="0" err="1">
+                <a:latin typeface="Consolas" panose="020B0609020204030204" pitchFamily="49" charset="0"/>
+              </a:rPr>
+              <a:t>ua</a:t>
+            </a:r>
+            <a:r>
+              <a:rPr lang="en-US" sz="1200" dirty="0">
+                <a:latin typeface="Consolas" panose="020B0609020204030204" pitchFamily="49" charset="0"/>
+              </a:rPr>
+              <a:t>-platform: ^\^"Windows^\^"" ^</a:t>
+            </a:r>
+          </a:p>
+          <a:p>
+            <a:r>
+              <a:rPr lang="en-US" sz="1200" dirty="0">
+                <a:latin typeface="Consolas" panose="020B0609020204030204" pitchFamily="49" charset="0"/>
+              </a:rPr>
+              <a:t>  --compressed</a:t>
+            </a:r>
           </a:p>
         </p:txBody>
       </p:sp>
     </p:spTree>
     <p:extLst>
       <p:ext uri="{BB962C8B-B14F-4D97-AF65-F5344CB8AC3E}">
-        <p14:creationId xmlns:p14="http://schemas.microsoft.com/office/powerpoint/2010/main" val="923356200"/>
+        <p14:creationId xmlns:p14="http://schemas.microsoft.com/office/powerpoint/2010/main" val="4226127547"/>
       </p:ext>
     </p:extLst>
   </p:cSld>
@@ -19270,7 +19167,7 @@
           <p:cNvPr id="2" name="Title 1">
             <a:extLst>
               <a:ext uri="{FF2B5EF4-FFF2-40B4-BE49-F238E27FC236}">
-                <a16:creationId xmlns:a16="http://schemas.microsoft.com/office/drawing/2014/main" id="{2C150B14-B6FC-5A5B-D90A-6B8C5C6DA36C}"/>
+                <a16:creationId xmlns:a16="http://schemas.microsoft.com/office/drawing/2014/main" id="{0E2EFFAF-1A2D-E0FD-E989-BCA4252319F6}"/>
               </a:ext>
             </a:extLst>
           </p:cNvPr>
@@ -19287,41 +19184,293 @@
           <a:lstStyle/>
           <a:p>
             <a:r>
+              <a:rPr lang="en-US" dirty="0" err="1"/>
+              <a:t>cURL</a:t>
+            </a:r>
+            <a:r>
               <a:rPr lang="en-US" dirty="0"/>
-              <a:t>Web services</a:t>
+              <a:t> is an extremely versatile tool</a:t>
             </a:r>
           </a:p>
         </p:txBody>
       </p:sp>
       <p:sp>
         <p:nvSpPr>
-          <p:cNvPr id="3" name="Text Placeholder 2">
+          <p:cNvPr id="3" name="TextBox 2">
             <a:extLst>
               <a:ext uri="{FF2B5EF4-FFF2-40B4-BE49-F238E27FC236}">
-                <a16:creationId xmlns:a16="http://schemas.microsoft.com/office/drawing/2014/main" id="{E1DF309F-A7C0-481F-D0AD-8003F5620642}"/>
+                <a16:creationId xmlns:a16="http://schemas.microsoft.com/office/drawing/2014/main" id="{661FB449-0556-92D6-BCC1-5D83D3BD292D}"/>
               </a:ext>
             </a:extLst>
           </p:cNvPr>
-          <p:cNvSpPr>
-            <a:spLocks noGrp="1"/>
-          </p:cNvSpPr>
-          <p:nvPr>
-            <p:ph type="body" idx="1"/>
-          </p:nvPr>
+          <p:cNvSpPr txBox="1"/>
+          <p:nvPr/>
         </p:nvSpPr>
-        <p:spPr/>
+        <p:spPr>
+          <a:xfrm>
+            <a:off x="575935" y="2335575"/>
+            <a:ext cx="9777035" cy="3170099"/>
+          </a:xfrm>
+          <a:prstGeom prst="rect">
+            <a:avLst/>
+          </a:prstGeom>
+          <a:noFill/>
+        </p:spPr>
         <p:txBody>
-          <a:bodyPr/>
+          <a:bodyPr wrap="none" rtlCol="0">
+            <a:spAutoFit/>
+          </a:bodyPr>
           <a:lstStyle/>
           <a:p>
-            <a:endParaRPr lang="en-US"/>
+            <a:r>
+              <a:rPr lang="en-US" sz="2000" dirty="0">
+                <a:solidFill>
+                  <a:schemeClr val="tx1">
+                    <a:lumMod val="75000"/>
+                    <a:lumOff val="25000"/>
+                  </a:schemeClr>
+                </a:solidFill>
+                <a:latin typeface="Georgia" panose="02040502050405020303" pitchFamily="18" charset="0"/>
+              </a:rPr>
+              <a:t>Normal </a:t>
+            </a:r>
+            <a:r>
+              <a:rPr lang="en-US" sz="2000" dirty="0">
+                <a:solidFill>
+                  <a:schemeClr val="tx1">
+                    <a:lumMod val="75000"/>
+                    <a:lumOff val="25000"/>
+                  </a:schemeClr>
+                </a:solidFill>
+                <a:latin typeface="Consolas" panose="020B0609020204030204" pitchFamily="49" charset="0"/>
+              </a:rPr>
+              <a:t>GET</a:t>
+            </a:r>
+            <a:r>
+              <a:rPr lang="en-US" sz="2000" dirty="0">
+                <a:solidFill>
+                  <a:schemeClr val="tx1">
+                    <a:lumMod val="75000"/>
+                    <a:lumOff val="25000"/>
+                  </a:schemeClr>
+                </a:solidFill>
+                <a:latin typeface="Georgia" panose="02040502050405020303" pitchFamily="18" charset="0"/>
+              </a:rPr>
+              <a:t> request</a:t>
+            </a:r>
+          </a:p>
+          <a:p>
+            <a:r>
+              <a:rPr lang="en-US" sz="2000" dirty="0">
+                <a:solidFill>
+                  <a:schemeClr val="tx1">
+                    <a:lumMod val="75000"/>
+                    <a:lumOff val="25000"/>
+                  </a:schemeClr>
+                </a:solidFill>
+                <a:latin typeface="Consolas" panose="020B0609020204030204" pitchFamily="49" charset="0"/>
+              </a:rPr>
+              <a:t>curl </a:t>
+            </a:r>
+            <a:r>
+              <a:rPr lang="en-US" sz="2000" dirty="0">
+                <a:solidFill>
+                  <a:schemeClr val="tx1">
+                    <a:lumMod val="75000"/>
+                    <a:lumOff val="25000"/>
+                  </a:schemeClr>
+                </a:solidFill>
+                <a:latin typeface="Consolas" panose="020B0609020204030204" pitchFamily="49" charset="0"/>
+                <a:hlinkClick r:id="rId2">
+                  <a:extLst>
+                    <a:ext uri="{A12FA001-AC4F-418D-AE19-62706E023703}">
+                      <ahyp:hlinkClr xmlns:ahyp="http://schemas.microsoft.com/office/drawing/2018/hyperlinkcolor" val="tx"/>
+                    </a:ext>
+                  </a:extLst>
+                </a:hlinkClick>
+              </a:rPr>
+              <a:t>http://somewebsite.com/some_resource</a:t>
+            </a:r>
+            <a:endParaRPr lang="en-US" sz="2000" dirty="0">
+              <a:solidFill>
+                <a:schemeClr val="tx1">
+                  <a:lumMod val="75000"/>
+                  <a:lumOff val="25000"/>
+                </a:schemeClr>
+              </a:solidFill>
+              <a:latin typeface="Consolas" panose="020B0609020204030204" pitchFamily="49" charset="0"/>
+            </a:endParaRPr>
+          </a:p>
+          <a:p>
+            <a:endParaRPr lang="en-US" sz="2000" dirty="0">
+              <a:solidFill>
+                <a:schemeClr val="tx1">
+                  <a:lumMod val="75000"/>
+                  <a:lumOff val="25000"/>
+                </a:schemeClr>
+              </a:solidFill>
+              <a:latin typeface="Georgia" panose="02040502050405020303" pitchFamily="18" charset="0"/>
+            </a:endParaRPr>
+          </a:p>
+          <a:p>
+            <a:endParaRPr lang="en-US" sz="2000" dirty="0">
+              <a:solidFill>
+                <a:schemeClr val="tx1">
+                  <a:lumMod val="75000"/>
+                  <a:lumOff val="25000"/>
+                </a:schemeClr>
+              </a:solidFill>
+              <a:latin typeface="Consolas" panose="020B0609020204030204" pitchFamily="49" charset="0"/>
+            </a:endParaRPr>
+          </a:p>
+          <a:p>
+            <a:r>
+              <a:rPr lang="en-US" sz="2000" dirty="0">
+                <a:solidFill>
+                  <a:schemeClr val="tx1">
+                    <a:lumMod val="75000"/>
+                    <a:lumOff val="25000"/>
+                  </a:schemeClr>
+                </a:solidFill>
+                <a:latin typeface="Consolas" panose="020B0609020204030204" pitchFamily="49" charset="0"/>
+              </a:rPr>
+              <a:t>POST</a:t>
+            </a:r>
+            <a:r>
+              <a:rPr lang="en-US" sz="2000" dirty="0">
+                <a:solidFill>
+                  <a:schemeClr val="tx1">
+                    <a:lumMod val="75000"/>
+                    <a:lumOff val="25000"/>
+                  </a:schemeClr>
+                </a:solidFill>
+                <a:latin typeface="Georgia" panose="02040502050405020303" pitchFamily="18" charset="0"/>
+              </a:rPr>
+              <a:t> request with a JSON payload</a:t>
+            </a:r>
+          </a:p>
+          <a:p>
+            <a:r>
+              <a:rPr lang="en-US" sz="2000" dirty="0">
+                <a:solidFill>
+                  <a:schemeClr val="tx1">
+                    <a:lumMod val="75000"/>
+                    <a:lumOff val="25000"/>
+                  </a:schemeClr>
+                </a:solidFill>
+                <a:latin typeface="Consolas" panose="020B0609020204030204" pitchFamily="49" charset="0"/>
+              </a:rPr>
+              <a:t>curl –X POST \</a:t>
+            </a:r>
+          </a:p>
+          <a:p>
+            <a:r>
+              <a:rPr lang="en-US" sz="2000" dirty="0">
+                <a:solidFill>
+                  <a:schemeClr val="tx1">
+                    <a:lumMod val="75000"/>
+                    <a:lumOff val="25000"/>
+                  </a:schemeClr>
+                </a:solidFill>
+                <a:latin typeface="Consolas" panose="020B0609020204030204" pitchFamily="49" charset="0"/>
+              </a:rPr>
+              <a:t>  –H “Content-Type: application/</a:t>
+            </a:r>
+            <a:r>
+              <a:rPr lang="en-US" sz="2000" dirty="0" err="1">
+                <a:solidFill>
+                  <a:schemeClr val="tx1">
+                    <a:lumMod val="75000"/>
+                    <a:lumOff val="25000"/>
+                  </a:schemeClr>
+                </a:solidFill>
+                <a:latin typeface="Consolas" panose="020B0609020204030204" pitchFamily="49" charset="0"/>
+              </a:rPr>
+              <a:t>json</a:t>
+            </a:r>
+            <a:r>
+              <a:rPr lang="en-US" sz="2000" dirty="0">
+                <a:solidFill>
+                  <a:schemeClr val="tx1">
+                    <a:lumMod val="75000"/>
+                    <a:lumOff val="25000"/>
+                  </a:schemeClr>
+                </a:solidFill>
+                <a:latin typeface="Consolas" panose="020B0609020204030204" pitchFamily="49" charset="0"/>
+              </a:rPr>
+              <a:t>” \</a:t>
+            </a:r>
+          </a:p>
+          <a:p>
+            <a:r>
+              <a:rPr lang="en-US" sz="2000" dirty="0">
+                <a:solidFill>
+                  <a:schemeClr val="tx1">
+                    <a:lumMod val="75000"/>
+                    <a:lumOff val="25000"/>
+                  </a:schemeClr>
+                </a:solidFill>
+                <a:latin typeface="Consolas" panose="020B0609020204030204" pitchFamily="49" charset="0"/>
+              </a:rPr>
+              <a:t>  –d “{param1:val, param2:val}” </a:t>
+            </a:r>
+            <a:r>
+              <a:rPr lang="en-US" sz="2000" dirty="0">
+                <a:solidFill>
+                  <a:schemeClr val="tx1">
+                    <a:lumMod val="75000"/>
+                    <a:lumOff val="25000"/>
+                  </a:schemeClr>
+                </a:solidFill>
+                <a:latin typeface="Consolas" panose="020B0609020204030204" pitchFamily="49" charset="0"/>
+                <a:hlinkClick r:id="rId2">
+                  <a:extLst>
+                    <a:ext uri="{A12FA001-AC4F-418D-AE19-62706E023703}">
+                      <ahyp:hlinkClr xmlns:ahyp="http://schemas.microsoft.com/office/drawing/2018/hyperlinkcolor" val="tx"/>
+                    </a:ext>
+                  </a:extLst>
+                </a:hlinkClick>
+              </a:rPr>
+              <a:t>http://somewebsite.com/some_resource</a:t>
+            </a:r>
+            <a:endParaRPr lang="en-US" sz="2000" dirty="0">
+              <a:solidFill>
+                <a:schemeClr val="tx1">
+                  <a:lumMod val="75000"/>
+                  <a:lumOff val="25000"/>
+                </a:schemeClr>
+              </a:solidFill>
+              <a:latin typeface="Consolas" panose="020B0609020204030204" pitchFamily="49" charset="0"/>
+            </a:endParaRPr>
+          </a:p>
+          <a:p>
+            <a:endParaRPr lang="en-US" sz="2000" dirty="0">
+              <a:solidFill>
+                <a:schemeClr val="tx1">
+                  <a:lumMod val="75000"/>
+                  <a:lumOff val="25000"/>
+                </a:schemeClr>
+              </a:solidFill>
+              <a:latin typeface="Georgia" panose="02040502050405020303" pitchFamily="18" charset="0"/>
+            </a:endParaRPr>
+          </a:p>
+          <a:p>
+            <a:endParaRPr lang="en-US" sz="2000" dirty="0">
+              <a:solidFill>
+                <a:schemeClr val="tx1">
+                  <a:lumMod val="75000"/>
+                  <a:lumOff val="25000"/>
+                </a:schemeClr>
+              </a:solidFill>
+              <a:latin typeface="Georgia" panose="02040502050405020303" pitchFamily="18" charset="0"/>
+            </a:endParaRPr>
           </a:p>
         </p:txBody>
       </p:sp>
     </p:spTree>
     <p:extLst>
       <p:ext uri="{BB962C8B-B14F-4D97-AF65-F5344CB8AC3E}">
-        <p14:creationId xmlns:p14="http://schemas.microsoft.com/office/powerpoint/2010/main" val="1301453426"/>
+        <p14:creationId xmlns:p14="http://schemas.microsoft.com/office/powerpoint/2010/main" val="923356200"/>
       </p:ext>
     </p:extLst>
   </p:cSld>
@@ -19353,6 +19502,89 @@
           <p:cNvPr id="2" name="Title 1">
             <a:extLst>
               <a:ext uri="{FF2B5EF4-FFF2-40B4-BE49-F238E27FC236}">
+                <a16:creationId xmlns:a16="http://schemas.microsoft.com/office/drawing/2014/main" id="{2C150B14-B6FC-5A5B-D90A-6B8C5C6DA36C}"/>
+              </a:ext>
+            </a:extLst>
+          </p:cNvPr>
+          <p:cNvSpPr>
+            <a:spLocks noGrp="1"/>
+          </p:cNvSpPr>
+          <p:nvPr>
+            <p:ph type="title"/>
+          </p:nvPr>
+        </p:nvSpPr>
+        <p:spPr/>
+        <p:txBody>
+          <a:bodyPr/>
+          <a:lstStyle/>
+          <a:p>
+            <a:r>
+              <a:rPr lang="en-US" dirty="0"/>
+              <a:t>Web services</a:t>
+            </a:r>
+          </a:p>
+        </p:txBody>
+      </p:sp>
+      <p:sp>
+        <p:nvSpPr>
+          <p:cNvPr id="3" name="Text Placeholder 2">
+            <a:extLst>
+              <a:ext uri="{FF2B5EF4-FFF2-40B4-BE49-F238E27FC236}">
+                <a16:creationId xmlns:a16="http://schemas.microsoft.com/office/drawing/2014/main" id="{E1DF309F-A7C0-481F-D0AD-8003F5620642}"/>
+              </a:ext>
+            </a:extLst>
+          </p:cNvPr>
+          <p:cNvSpPr>
+            <a:spLocks noGrp="1"/>
+          </p:cNvSpPr>
+          <p:nvPr>
+            <p:ph type="body" idx="1"/>
+          </p:nvPr>
+        </p:nvSpPr>
+        <p:spPr/>
+        <p:txBody>
+          <a:bodyPr/>
+          <a:lstStyle/>
+          <a:p>
+            <a:endParaRPr lang="en-US"/>
+          </a:p>
+        </p:txBody>
+      </p:sp>
+    </p:spTree>
+    <p:extLst>
+      <p:ext uri="{BB962C8B-B14F-4D97-AF65-F5344CB8AC3E}">
+        <p14:creationId xmlns:p14="http://schemas.microsoft.com/office/powerpoint/2010/main" val="1301453426"/>
+      </p:ext>
+    </p:extLst>
+  </p:cSld>
+  <p:clrMapOvr>
+    <a:masterClrMapping/>
+  </p:clrMapOvr>
+</p:sld>
+</file>
+
+<file path=ppt/slides/slide33.xml><?xml version="1.0" encoding="utf-8"?>
+<p:sld xmlns:a="http://schemas.openxmlformats.org/drawingml/2006/main" xmlns:r="http://schemas.openxmlformats.org/officeDocument/2006/relationships" xmlns:p="http://schemas.openxmlformats.org/presentationml/2006/main">
+  <p:cSld>
+    <p:spTree>
+      <p:nvGrpSpPr>
+        <p:cNvPr id="1" name=""/>
+        <p:cNvGrpSpPr/>
+        <p:nvPr/>
+      </p:nvGrpSpPr>
+      <p:grpSpPr>
+        <a:xfrm>
+          <a:off x="0" y="0"/>
+          <a:ext cx="0" cy="0"/>
+          <a:chOff x="0" y="0"/>
+          <a:chExt cx="0" cy="0"/>
+        </a:xfrm>
+      </p:grpSpPr>
+      <p:sp>
+        <p:nvSpPr>
+          <p:cNvPr id="2" name="Title 1">
+            <a:extLst>
+              <a:ext uri="{FF2B5EF4-FFF2-40B4-BE49-F238E27FC236}">
                 <a16:creationId xmlns:a16="http://schemas.microsoft.com/office/drawing/2014/main" id="{392D9B69-436F-1C91-33F5-EEEAD056E776}"/>
               </a:ext>
             </a:extLst>
@@ -19447,7 +19679,7 @@
 </p:sld>
 </file>
 
-<file path=ppt/slides/slide33.xml><?xml version="1.0" encoding="utf-8"?>
+<file path=ppt/slides/slide34.xml><?xml version="1.0" encoding="utf-8"?>
 <p:sld xmlns:a="http://schemas.openxmlformats.org/drawingml/2006/main" xmlns:r="http://schemas.openxmlformats.org/officeDocument/2006/relationships" xmlns:p="http://schemas.openxmlformats.org/presentationml/2006/main">
   <p:cSld>
     <p:spTree>
@@ -20468,7 +20700,7 @@
 </p:sld>
 </file>
 
-<file path=ppt/slides/slide34.xml><?xml version="1.0" encoding="utf-8"?>
+<file path=ppt/slides/slide35.xml><?xml version="1.0" encoding="utf-8"?>
 <p:sld xmlns:a="http://schemas.openxmlformats.org/drawingml/2006/main" xmlns:r="http://schemas.openxmlformats.org/officeDocument/2006/relationships" xmlns:p="http://schemas.openxmlformats.org/presentationml/2006/main">
   <p:cSld>
     <p:spTree>
@@ -21508,7 +21740,7 @@
 </p:sld>
 </file>
 
-<file path=ppt/slides/slide35.xml><?xml version="1.0" encoding="utf-8"?>
+<file path=ppt/slides/slide36.xml><?xml version="1.0" encoding="utf-8"?>
 <p:sld xmlns:a="http://schemas.openxmlformats.org/drawingml/2006/main" xmlns:r="http://schemas.openxmlformats.org/officeDocument/2006/relationships" xmlns:p="http://schemas.openxmlformats.org/presentationml/2006/main">
   <p:cSld>
     <p:spTree>
@@ -22867,7 +23099,7 @@
 </p:sld>
 </file>
 
-<file path=ppt/slides/slide36.xml><?xml version="1.0" encoding="utf-8"?>
+<file path=ppt/slides/slide37.xml><?xml version="1.0" encoding="utf-8"?>
 <p:sld xmlns:a="http://schemas.openxmlformats.org/drawingml/2006/main" xmlns:r="http://schemas.openxmlformats.org/officeDocument/2006/relationships" xmlns:p="http://schemas.openxmlformats.org/presentationml/2006/main">
   <p:cSld>
     <p:spTree>
@@ -22902,7 +23134,7 @@
         </p:nvSpPr>
         <p:spPr>
           <a:xfrm>
-            <a:off x="831850" y="1709739"/>
+            <a:off x="831850" y="228566"/>
             <a:ext cx="10515600" cy="1719262"/>
           </a:xfrm>
         </p:spPr>
@@ -22935,7 +23167,7 @@
         </p:nvSpPr>
         <p:spPr>
           <a:xfrm>
-            <a:off x="831850" y="3429001"/>
+            <a:off x="831850" y="2098969"/>
             <a:ext cx="10515600" cy="2660650"/>
           </a:xfrm>
         </p:spPr>
@@ -23035,6 +23267,184 @@
                 </a:solidFill>
               </a:rPr>
               <a:t>/ipconfig) and port with me so I (and others) can test your service.</a:t>
+            </a:r>
+          </a:p>
+        </p:txBody>
+      </p:sp>
+      <p:sp>
+        <p:nvSpPr>
+          <p:cNvPr id="5" name="TextBox 4">
+            <a:extLst>
+              <a:ext uri="{FF2B5EF4-FFF2-40B4-BE49-F238E27FC236}">
+                <a16:creationId xmlns:a16="http://schemas.microsoft.com/office/drawing/2014/main" id="{C3210A8B-F247-F599-A54C-6C0CA7FBF9FC}"/>
+              </a:ext>
+            </a:extLst>
+          </p:cNvPr>
+          <p:cNvSpPr txBox="1"/>
+          <p:nvPr/>
+        </p:nvSpPr>
+        <p:spPr>
+          <a:xfrm>
+            <a:off x="831850" y="5133007"/>
+            <a:ext cx="10515600" cy="1446550"/>
+          </a:xfrm>
+          <a:prstGeom prst="rect">
+            <a:avLst/>
+          </a:prstGeom>
+          <a:noFill/>
+        </p:spPr>
+        <p:txBody>
+          <a:bodyPr wrap="square">
+            <a:spAutoFit/>
+          </a:bodyPr>
+          <a:lstStyle/>
+          <a:p>
+            <a:r>
+              <a:rPr lang="fr-FR" b="0" i="0" dirty="0">
+                <a:solidFill>
+                  <a:srgbClr val="242424"/>
+                </a:solidFill>
+                <a:effectLst/>
+                <a:latin typeface="Georgia" panose="02040502050405020303" pitchFamily="18" charset="0"/>
+              </a:rPr>
+              <a:t>Mac </a:t>
+            </a:r>
+            <a:r>
+              <a:rPr lang="fr-FR" b="0" i="0" dirty="0" err="1">
+                <a:solidFill>
+                  <a:srgbClr val="242424"/>
+                </a:solidFill>
+                <a:effectLst/>
+                <a:latin typeface="Georgia" panose="02040502050405020303" pitchFamily="18" charset="0"/>
+              </a:rPr>
+              <a:t>users</a:t>
+            </a:r>
+            <a:r>
+              <a:rPr lang="fr-FR" b="0" i="0" dirty="0">
+                <a:solidFill>
+                  <a:srgbClr val="242424"/>
+                </a:solidFill>
+                <a:effectLst/>
+                <a:latin typeface="Georgia" panose="02040502050405020303" pitchFamily="18" charset="0"/>
+              </a:rPr>
+              <a:t>:</a:t>
+            </a:r>
+          </a:p>
+          <a:p>
+            <a:r>
+              <a:rPr lang="fr-FR" sz="1400" b="0" i="0" dirty="0" err="1">
+                <a:solidFill>
+                  <a:srgbClr val="242424"/>
+                </a:solidFill>
+                <a:effectLst/>
+                <a:latin typeface="Consolas" panose="020B0609020204030204" pitchFamily="49" charset="0"/>
+              </a:rPr>
+              <a:t>curl</a:t>
+            </a:r>
+            <a:r>
+              <a:rPr lang="fr-FR" sz="1400" b="0" i="0" dirty="0">
+                <a:solidFill>
+                  <a:srgbClr val="242424"/>
+                </a:solidFill>
+                <a:effectLst/>
+                <a:latin typeface="Consolas" panose="020B0609020204030204" pitchFamily="49" charset="0"/>
+              </a:rPr>
+              <a:t> -X POST </a:t>
+            </a:r>
+            <a:r>
+              <a:rPr lang="fr-FR" sz="1400" b="0" i="0" dirty="0">
+                <a:effectLst/>
+                <a:latin typeface="Consolas" panose="020B0609020204030204" pitchFamily="49" charset="0"/>
+                <a:hlinkClick r:id="rId2"/>
+              </a:rPr>
+              <a:t>http://localhost:8080/get_num</a:t>
+            </a:r>
+            <a:r>
+              <a:rPr lang="fr-FR" sz="1400" b="0" i="0" dirty="0">
+                <a:solidFill>
+                  <a:srgbClr val="242424"/>
+                </a:solidFill>
+                <a:effectLst/>
+                <a:latin typeface="Consolas" panose="020B0609020204030204" pitchFamily="49" charset="0"/>
+              </a:rPr>
+              <a:t> -H "Content-Type: application/</a:t>
+            </a:r>
+            <a:r>
+              <a:rPr lang="fr-FR" sz="1400" b="0" i="0" dirty="0" err="1">
+                <a:solidFill>
+                  <a:srgbClr val="242424"/>
+                </a:solidFill>
+                <a:effectLst/>
+                <a:latin typeface="Consolas" panose="020B0609020204030204" pitchFamily="49" charset="0"/>
+              </a:rPr>
+              <a:t>json</a:t>
+            </a:r>
+            <a:r>
+              <a:rPr lang="fr-FR" sz="1400" b="0" i="0" dirty="0">
+                <a:solidFill>
+                  <a:srgbClr val="242424"/>
+                </a:solidFill>
+                <a:effectLst/>
+                <a:latin typeface="Consolas" panose="020B0609020204030204" pitchFamily="49" charset="0"/>
+              </a:rPr>
+              <a:t>" -d '{"x": 5, "y": 5}’</a:t>
+            </a:r>
+          </a:p>
+          <a:p>
+            <a:endParaRPr lang="fr-FR" sz="1400" dirty="0">
+              <a:solidFill>
+                <a:srgbClr val="242424"/>
+              </a:solidFill>
+              <a:latin typeface="Consolas" panose="020B0609020204030204" pitchFamily="49" charset="0"/>
+            </a:endParaRPr>
+          </a:p>
+          <a:p>
+            <a:r>
+              <a:rPr lang="fr-FR" sz="1400" dirty="0">
+                <a:solidFill>
+                  <a:srgbClr val="242424"/>
+                </a:solidFill>
+                <a:latin typeface="Georgia" panose="02040502050405020303" pitchFamily="18" charset="0"/>
+              </a:rPr>
+              <a:t>Windows </a:t>
+            </a:r>
+            <a:r>
+              <a:rPr lang="fr-FR" sz="1400" dirty="0" err="1">
+                <a:solidFill>
+                  <a:srgbClr val="242424"/>
+                </a:solidFill>
+                <a:latin typeface="Georgia" panose="02040502050405020303" pitchFamily="18" charset="0"/>
+              </a:rPr>
+              <a:t>users</a:t>
+            </a:r>
+            <a:r>
+              <a:rPr lang="fr-FR" sz="1400" dirty="0">
+                <a:solidFill>
+                  <a:srgbClr val="242424"/>
+                </a:solidFill>
+                <a:latin typeface="Georgia" panose="02040502050405020303" pitchFamily="18" charset="0"/>
+              </a:rPr>
+              <a:t>:</a:t>
+            </a:r>
+          </a:p>
+          <a:p>
+            <a:r>
+              <a:rPr lang="en-US" sz="1400" dirty="0">
+                <a:latin typeface="Consolas" panose="020B0609020204030204" pitchFamily="49" charset="0"/>
+              </a:rPr>
+              <a:t>Invoke-</a:t>
+            </a:r>
+            <a:r>
+              <a:rPr lang="en-US" sz="1400" dirty="0" err="1">
+                <a:latin typeface="Consolas" panose="020B0609020204030204" pitchFamily="49" charset="0"/>
+              </a:rPr>
+              <a:t>RestMethod</a:t>
+            </a:r>
+            <a:r>
+              <a:rPr lang="en-US" sz="1400" dirty="0">
+                <a:latin typeface="Consolas" panose="020B0609020204030204" pitchFamily="49" charset="0"/>
+              </a:rPr>
+              <a:t> -Uri http://localhost:5000/get_num -Method Post -Headers @{"Content-Type"="application/json"} -Body '{"x": 5, "y": 5}'</a:t>
             </a:r>
           </a:p>
         </p:txBody>
@@ -23052,7 +23462,7 @@
 </p:sld>
 </file>
 
-<file path=ppt/slides/slide37.xml><?xml version="1.0" encoding="utf-8"?>
+<file path=ppt/slides/slide38.xml><?xml version="1.0" encoding="utf-8"?>
 <p:sld xmlns:a="http://schemas.openxmlformats.org/drawingml/2006/main" xmlns:r="http://schemas.openxmlformats.org/officeDocument/2006/relationships" xmlns:p="http://schemas.openxmlformats.org/presentationml/2006/main">
   <p:cSld>
     <p:spTree>
@@ -23135,7 +23545,7 @@
 </p:sld>
 </file>
 
-<file path=ppt/slides/slide38.xml><?xml version="1.0" encoding="utf-8"?>
+<file path=ppt/slides/slide39.xml><?xml version="1.0" encoding="utf-8"?>
 <p:sld xmlns:a="http://schemas.openxmlformats.org/drawingml/2006/main" xmlns:r="http://schemas.openxmlformats.org/officeDocument/2006/relationships" xmlns:p="http://schemas.openxmlformats.org/presentationml/2006/main">
   <p:cSld>
     <p:spTree>

</xml_diff>

<commit_message>
updates the presentation with fastapi examples
</commit_message>
<xml_diff>
--- a/lectures/075_web_under_the_hood/The web, under the hood.pptx
+++ b/lectures/075_web_under_the_hood/The web, under the hood.pptx
@@ -516,7 +516,7 @@
   <pc:docChgLst>
     <pc:chgData name="Shahbaz Chaudhary" userId="fef21e47db54da50" providerId="LiveId" clId="{0A314D1D-CCC4-4710-95A4-19ACC5BA011A}"/>
     <pc:docChg chg="undo redo custSel addSld delSld modSld sldOrd">
-      <pc:chgData name="Shahbaz Chaudhary" userId="fef21e47db54da50" providerId="LiveId" clId="{0A314D1D-CCC4-4710-95A4-19ACC5BA011A}" dt="2025-02-10T00:35:50.731" v="1558" actId="1076"/>
+      <pc:chgData name="Shahbaz Chaudhary" userId="fef21e47db54da50" providerId="LiveId" clId="{0A314D1D-CCC4-4710-95A4-19ACC5BA011A}" dt="2025-02-13T02:33:00.788" v="1610" actId="20577"/>
       <pc:docMkLst>
         <pc:docMk/>
       </pc:docMkLst>
@@ -644,13 +644,13 @@
         </pc:spChg>
       </pc:sldChg>
       <pc:sldChg chg="modSp mod">
-        <pc:chgData name="Shahbaz Chaudhary" userId="fef21e47db54da50" providerId="LiveId" clId="{0A314D1D-CCC4-4710-95A4-19ACC5BA011A}" dt="2025-02-10T00:26:37.066" v="1502"/>
+        <pc:chgData name="Shahbaz Chaudhary" userId="fef21e47db54da50" providerId="LiveId" clId="{0A314D1D-CCC4-4710-95A4-19ACC5BA011A}" dt="2025-02-12T01:27:13.151" v="1562" actId="20577"/>
         <pc:sldMkLst>
           <pc:docMk/>
           <pc:sldMk cId="1732603864" sldId="286"/>
         </pc:sldMkLst>
         <pc:spChg chg="mod">
-          <ac:chgData name="Shahbaz Chaudhary" userId="fef21e47db54da50" providerId="LiveId" clId="{0A314D1D-CCC4-4710-95A4-19ACC5BA011A}" dt="2025-02-10T00:26:37.066" v="1502"/>
+          <ac:chgData name="Shahbaz Chaudhary" userId="fef21e47db54da50" providerId="LiveId" clId="{0A314D1D-CCC4-4710-95A4-19ACC5BA011A}" dt="2025-02-12T01:27:13.151" v="1562" actId="20577"/>
           <ac:spMkLst>
             <pc:docMk/>
             <pc:sldMk cId="1732603864" sldId="286"/>
@@ -688,18 +688,42 @@
           </ac:spMkLst>
         </pc:spChg>
       </pc:sldChg>
-      <pc:sldChg chg="modSp mod">
-        <pc:chgData name="Shahbaz Chaudhary" userId="fef21e47db54da50" providerId="LiveId" clId="{0A314D1D-CCC4-4710-95A4-19ACC5BA011A}" dt="2025-02-10T00:32:59.124" v="1509" actId="14100"/>
+      <pc:sldChg chg="addSp delSp modSp mod">
+        <pc:chgData name="Shahbaz Chaudhary" userId="fef21e47db54da50" providerId="LiveId" clId="{0A314D1D-CCC4-4710-95A4-19ACC5BA011A}" dt="2025-02-13T02:33:00.788" v="1610" actId="20577"/>
         <pc:sldMkLst>
           <pc:docMk/>
           <pc:sldMk cId="2895409309" sldId="291"/>
         </pc:sldMkLst>
+        <pc:spChg chg="del mod">
+          <ac:chgData name="Shahbaz Chaudhary" userId="fef21e47db54da50" providerId="LiveId" clId="{0A314D1D-CCC4-4710-95A4-19ACC5BA011A}" dt="2025-02-13T02:16:51.202" v="1571" actId="478"/>
+          <ac:spMkLst>
+            <pc:docMk/>
+            <pc:sldMk cId="2895409309" sldId="291"/>
+            <ac:spMk id="3" creationId="{76BD1211-8EC5-9945-C383-92BB2F9F0464}"/>
+          </ac:spMkLst>
+        </pc:spChg>
         <pc:spChg chg="mod">
-          <ac:chgData name="Shahbaz Chaudhary" userId="fef21e47db54da50" providerId="LiveId" clId="{0A314D1D-CCC4-4710-95A4-19ACC5BA011A}" dt="2025-02-10T00:32:59.124" v="1509" actId="14100"/>
+          <ac:chgData name="Shahbaz Chaudhary" userId="fef21e47db54da50" providerId="LiveId" clId="{0A314D1D-CCC4-4710-95A4-19ACC5BA011A}" dt="2025-02-13T02:33:00.788" v="1610" actId="20577"/>
           <ac:spMkLst>
             <pc:docMk/>
             <pc:sldMk cId="2895409309" sldId="291"/>
             <ac:spMk id="6" creationId="{4D02E26F-3A81-778B-914A-247A466281FD}"/>
+          </ac:spMkLst>
+        </pc:spChg>
+        <pc:spChg chg="add del">
+          <ac:chgData name="Shahbaz Chaudhary" userId="fef21e47db54da50" providerId="LiveId" clId="{0A314D1D-CCC4-4710-95A4-19ACC5BA011A}" dt="2025-02-13T02:22:59.256" v="1575" actId="22"/>
+          <ac:spMkLst>
+            <pc:docMk/>
+            <pc:sldMk cId="2895409309" sldId="291"/>
+            <ac:spMk id="8" creationId="{8B16F839-E5F2-6CF7-ADC5-4D2C175D78E1}"/>
+          </ac:spMkLst>
+        </pc:spChg>
+        <pc:spChg chg="add del mod">
+          <ac:chgData name="Shahbaz Chaudhary" userId="fef21e47db54da50" providerId="LiveId" clId="{0A314D1D-CCC4-4710-95A4-19ACC5BA011A}" dt="2025-02-13T02:23:33.722" v="1579" actId="478"/>
+          <ac:spMkLst>
+            <pc:docMk/>
+            <pc:sldMk cId="2895409309" sldId="291"/>
+            <ac:spMk id="10" creationId="{3328B8E6-32BE-1E95-A694-8106A70AA556}"/>
           </ac:spMkLst>
         </pc:spChg>
       </pc:sldChg>
@@ -732,28 +756,19 @@
             <ac:spMk id="2" creationId="{0F624EA2-9A71-5ADB-C492-E060C1192EF4}"/>
           </ac:spMkLst>
         </pc:spChg>
-        <pc:spChg chg="del mod">
-          <ac:chgData name="Shahbaz Chaudhary" userId="fef21e47db54da50" providerId="LiveId" clId="{0A314D1D-CCC4-4710-95A4-19ACC5BA011A}" dt="2025-02-10T00:35:41.565" v="1555" actId="478"/>
+      </pc:sldChg>
+      <pc:sldChg chg="modSp mod">
+        <pc:chgData name="Shahbaz Chaudhary" userId="fef21e47db54da50" providerId="LiveId" clId="{0A314D1D-CCC4-4710-95A4-19ACC5BA011A}" dt="2025-02-12T01:47:23.169" v="1565" actId="1076"/>
+        <pc:sldMkLst>
+          <pc:docMk/>
+          <pc:sldMk cId="1152813254" sldId="296"/>
+        </pc:sldMkLst>
+        <pc:spChg chg="mod">
+          <ac:chgData name="Shahbaz Chaudhary" userId="fef21e47db54da50" providerId="LiveId" clId="{0A314D1D-CCC4-4710-95A4-19ACC5BA011A}" dt="2025-02-12T01:47:23.169" v="1565" actId="1076"/>
           <ac:spMkLst>
             <pc:docMk/>
-            <pc:sldMk cId="579753958" sldId="294"/>
-            <ac:spMk id="3" creationId="{7711FD63-F1FB-CC7D-C773-93F3E9FA319D}"/>
-          </ac:spMkLst>
-        </pc:spChg>
-        <pc:spChg chg="del">
-          <ac:chgData name="Shahbaz Chaudhary" userId="fef21e47db54da50" providerId="LiveId" clId="{0A314D1D-CCC4-4710-95A4-19ACC5BA011A}" dt="2025-02-10T00:35:46.961" v="1557" actId="478"/>
-          <ac:spMkLst>
-            <pc:docMk/>
-            <pc:sldMk cId="579753958" sldId="294"/>
-            <ac:spMk id="5" creationId="{C3210A8B-F247-F599-A54C-6C0CA7FBF9FC}"/>
-          </ac:spMkLst>
-        </pc:spChg>
-        <pc:spChg chg="add del mod">
-          <ac:chgData name="Shahbaz Chaudhary" userId="fef21e47db54da50" providerId="LiveId" clId="{0A314D1D-CCC4-4710-95A4-19ACC5BA011A}" dt="2025-02-10T00:35:44.173" v="1556" actId="478"/>
-          <ac:spMkLst>
-            <pc:docMk/>
-            <pc:sldMk cId="579753958" sldId="294"/>
-            <ac:spMk id="6" creationId="{30119EB1-1B50-6766-7A08-97D43E3A0661}"/>
+            <pc:sldMk cId="1152813254" sldId="296"/>
+            <ac:spMk id="3" creationId="{C2FCFE72-1373-9A46-87BC-BD99E6CDA04D}"/>
           </ac:spMkLst>
         </pc:spChg>
       </pc:sldChg>
@@ -1104,7 +1119,7 @@
           <a:p>
             <a:fld id="{5892DAFE-CDAC-4B0E-AD8C-F5134B67DF4E}" type="datetimeFigureOut">
               <a:rPr lang="en-US" smtClean="0"/>
-              <a:t>2/3/2025</a:t>
+              <a:t>2/11/2025</a:t>
             </a:fld>
             <a:endParaRPr lang="en-US"/>
           </a:p>
@@ -1302,7 +1317,7 @@
           <a:p>
             <a:fld id="{5892DAFE-CDAC-4B0E-AD8C-F5134B67DF4E}" type="datetimeFigureOut">
               <a:rPr lang="en-US" smtClean="0"/>
-              <a:t>2/3/2025</a:t>
+              <a:t>2/11/2025</a:t>
             </a:fld>
             <a:endParaRPr lang="en-US"/>
           </a:p>
@@ -1510,7 +1525,7 @@
           <a:p>
             <a:fld id="{5892DAFE-CDAC-4B0E-AD8C-F5134B67DF4E}" type="datetimeFigureOut">
               <a:rPr lang="en-US" smtClean="0"/>
-              <a:t>2/3/2025</a:t>
+              <a:t>2/11/2025</a:t>
             </a:fld>
             <a:endParaRPr lang="en-US"/>
           </a:p>
@@ -1708,7 +1723,7 @@
           <a:p>
             <a:fld id="{5892DAFE-CDAC-4B0E-AD8C-F5134B67DF4E}" type="datetimeFigureOut">
               <a:rPr lang="en-US" smtClean="0"/>
-              <a:t>2/3/2025</a:t>
+              <a:t>2/11/2025</a:t>
             </a:fld>
             <a:endParaRPr lang="en-US"/>
           </a:p>
@@ -1983,7 +1998,7 @@
           <a:p>
             <a:fld id="{5892DAFE-CDAC-4B0E-AD8C-F5134B67DF4E}" type="datetimeFigureOut">
               <a:rPr lang="en-US" smtClean="0"/>
-              <a:t>2/3/2025</a:t>
+              <a:t>2/11/2025</a:t>
             </a:fld>
             <a:endParaRPr lang="en-US"/>
           </a:p>
@@ -2248,7 +2263,7 @@
           <a:p>
             <a:fld id="{5892DAFE-CDAC-4B0E-AD8C-F5134B67DF4E}" type="datetimeFigureOut">
               <a:rPr lang="en-US" smtClean="0"/>
-              <a:t>2/3/2025</a:t>
+              <a:t>2/11/2025</a:t>
             </a:fld>
             <a:endParaRPr lang="en-US"/>
           </a:p>
@@ -2660,7 +2675,7 @@
           <a:p>
             <a:fld id="{5892DAFE-CDAC-4B0E-AD8C-F5134B67DF4E}" type="datetimeFigureOut">
               <a:rPr lang="en-US" smtClean="0"/>
-              <a:t>2/3/2025</a:t>
+              <a:t>2/11/2025</a:t>
             </a:fld>
             <a:endParaRPr lang="en-US"/>
           </a:p>
@@ -2801,7 +2816,7 @@
           <a:p>
             <a:fld id="{5892DAFE-CDAC-4B0E-AD8C-F5134B67DF4E}" type="datetimeFigureOut">
               <a:rPr lang="en-US" smtClean="0"/>
-              <a:t>2/3/2025</a:t>
+              <a:t>2/11/2025</a:t>
             </a:fld>
             <a:endParaRPr lang="en-US"/>
           </a:p>
@@ -2914,7 +2929,7 @@
           <a:p>
             <a:fld id="{5892DAFE-CDAC-4B0E-AD8C-F5134B67DF4E}" type="datetimeFigureOut">
               <a:rPr lang="en-US" smtClean="0"/>
-              <a:t>2/3/2025</a:t>
+              <a:t>2/11/2025</a:t>
             </a:fld>
             <a:endParaRPr lang="en-US"/>
           </a:p>
@@ -3225,7 +3240,7 @@
           <a:p>
             <a:fld id="{5892DAFE-CDAC-4B0E-AD8C-F5134B67DF4E}" type="datetimeFigureOut">
               <a:rPr lang="en-US" smtClean="0"/>
-              <a:t>2/3/2025</a:t>
+              <a:t>2/11/2025</a:t>
             </a:fld>
             <a:endParaRPr lang="en-US"/>
           </a:p>
@@ -3513,7 +3528,7 @@
           <a:p>
             <a:fld id="{5892DAFE-CDAC-4B0E-AD8C-F5134B67DF4E}" type="datetimeFigureOut">
               <a:rPr lang="en-US" smtClean="0"/>
-              <a:t>2/3/2025</a:t>
+              <a:t>2/11/2025</a:t>
             </a:fld>
             <a:endParaRPr lang="en-US"/>
           </a:p>
@@ -3759,7 +3774,7 @@
           <a:p>
             <a:fld id="{5892DAFE-CDAC-4B0E-AD8C-F5134B67DF4E}" type="datetimeFigureOut">
               <a:rPr lang="en-US" smtClean="0"/>
-              <a:t>2/3/2025</a:t>
+              <a:t>2/11/2025</a:t>
             </a:fld>
             <a:endParaRPr lang="en-US"/>
           </a:p>
@@ -21242,7 +21257,7 @@
                 <a:effectLst/>
                 <a:latin typeface="Consolas" panose="020B0609020204030204" pitchFamily="49" charset="0"/>
               </a:rPr>
-              <a:t> dev serve_json.py</a:t>
+              <a:t> dev serve_text.py</a:t>
             </a:r>
             <a:endParaRPr lang="en-US" sz="1600" b="0" dirty="0">
               <a:solidFill>
@@ -23846,8 +23861,8 @@
         </p:nvSpPr>
         <p:spPr>
           <a:xfrm>
-            <a:off x="712585" y="1833595"/>
-            <a:ext cx="4906677" cy="4761560"/>
+            <a:off x="416893" y="1578558"/>
+            <a:ext cx="5335790" cy="5120633"/>
           </a:xfrm>
           <a:prstGeom prst="rect">
             <a:avLst/>
@@ -24113,7 +24128,148 @@
                 <a:effectLst/>
                 <a:latin typeface="Consolas" panose="020B0609020204030204" pitchFamily="49" charset="0"/>
               </a:rPr>
-              <a:t>…</a:t>
+              <a:t>@app.get</a:t>
+            </a:r>
+            <a:r>
+              <a:rPr lang="en-US" sz="1400" b="0" dirty="0">
+                <a:solidFill>
+                  <a:srgbClr val="333333"/>
+                </a:solidFill>
+                <a:effectLst/>
+                <a:latin typeface="Consolas" panose="020B0609020204030204" pitchFamily="49" charset="0"/>
+              </a:rPr>
+              <a:t>(</a:t>
+            </a:r>
+            <a:r>
+              <a:rPr lang="en-US" sz="1400" b="0" dirty="0">
+                <a:solidFill>
+                  <a:srgbClr val="998F2F"/>
+                </a:solidFill>
+                <a:effectLst/>
+                <a:latin typeface="Consolas" panose="020B0609020204030204" pitchFamily="49" charset="0"/>
+              </a:rPr>
+              <a:t>'/get_time’</a:t>
+            </a:r>
+            <a:r>
+              <a:rPr lang="en-US" sz="1400" b="0" dirty="0">
+                <a:solidFill>
+                  <a:srgbClr val="333333"/>
+                </a:solidFill>
+                <a:effectLst/>
+                <a:latin typeface="Consolas" panose="020B0609020204030204" pitchFamily="49" charset="0"/>
+              </a:rPr>
+              <a:t>)</a:t>
+            </a:r>
+          </a:p>
+          <a:p>
+            <a:pPr>
+              <a:lnSpc>
+                <a:spcPts val="1425"/>
+              </a:lnSpc>
+            </a:pPr>
+            <a:r>
+              <a:rPr lang="en-US" sz="1400" b="0" i="1" dirty="0">
+                <a:solidFill>
+                  <a:srgbClr val="0089B3"/>
+                </a:solidFill>
+                <a:effectLst/>
+                <a:latin typeface="Consolas" panose="020B0609020204030204" pitchFamily="49" charset="0"/>
+              </a:rPr>
+              <a:t>...</a:t>
+            </a:r>
+          </a:p>
+          <a:p>
+            <a:pPr>
+              <a:lnSpc>
+                <a:spcPts val="1425"/>
+              </a:lnSpc>
+            </a:pPr>
+            <a:r>
+              <a:rPr lang="en-US" sz="1400" b="0" i="1" dirty="0">
+                <a:solidFill>
+                  <a:srgbClr val="0089B3"/>
+                </a:solidFill>
+                <a:effectLst/>
+                <a:latin typeface="Consolas" panose="020B0609020204030204" pitchFamily="49" charset="0"/>
+              </a:rPr>
+              <a:t>class</a:t>
+            </a:r>
+            <a:r>
+              <a:rPr lang="en-US" sz="1400" b="0" dirty="0">
+                <a:solidFill>
+                  <a:srgbClr val="333333"/>
+                </a:solidFill>
+                <a:effectLst/>
+                <a:latin typeface="Consolas" panose="020B0609020204030204" pitchFamily="49" charset="0"/>
+              </a:rPr>
+              <a:t> </a:t>
+            </a:r>
+            <a:r>
+              <a:rPr lang="en-US" sz="1400" b="0" u="sng" dirty="0" err="1">
+                <a:solidFill>
+                  <a:srgbClr val="679C00"/>
+                </a:solidFill>
+                <a:effectLst/>
+                <a:latin typeface="Consolas" panose="020B0609020204030204" pitchFamily="49" charset="0"/>
+              </a:rPr>
+              <a:t>ClientData</a:t>
+            </a:r>
+            <a:r>
+              <a:rPr lang="en-US" sz="1400" b="0" dirty="0">
+                <a:solidFill>
+                  <a:srgbClr val="333333"/>
+                </a:solidFill>
+                <a:effectLst/>
+                <a:latin typeface="Consolas" panose="020B0609020204030204" pitchFamily="49" charset="0"/>
+              </a:rPr>
+              <a:t>(</a:t>
+            </a:r>
+            <a:r>
+              <a:rPr lang="en-US" sz="1400" b="0" i="1" u="sng" dirty="0" err="1">
+                <a:solidFill>
+                  <a:srgbClr val="679C00"/>
+                </a:solidFill>
+                <a:effectLst/>
+                <a:latin typeface="Consolas" panose="020B0609020204030204" pitchFamily="49" charset="0"/>
+              </a:rPr>
+              <a:t>BaseModel</a:t>
+            </a:r>
+            <a:r>
+              <a:rPr lang="en-US" sz="1400" b="0" dirty="0">
+                <a:solidFill>
+                  <a:srgbClr val="333333"/>
+                </a:solidFill>
+                <a:effectLst/>
+                <a:latin typeface="Consolas" panose="020B0609020204030204" pitchFamily="49" charset="0"/>
+              </a:rPr>
+              <a:t>):</a:t>
+            </a:r>
+          </a:p>
+          <a:p>
+            <a:pPr>
+              <a:lnSpc>
+                <a:spcPts val="1425"/>
+              </a:lnSpc>
+            </a:pPr>
+            <a:r>
+              <a:rPr lang="en-US" sz="1400" b="0" dirty="0">
+                <a:solidFill>
+                  <a:srgbClr val="333333"/>
+                </a:solidFill>
+                <a:effectLst/>
+                <a:latin typeface="Consolas" panose="020B0609020204030204" pitchFamily="49" charset="0"/>
+              </a:rPr>
+              <a:t>    gender: </a:t>
+            </a:r>
+            <a:r>
+              <a:rPr lang="en-US" sz="1400" b="0" i="1" dirty="0">
+                <a:solidFill>
+                  <a:srgbClr val="0089B3"/>
+                </a:solidFill>
+                <a:effectLst/>
+                <a:latin typeface="Consolas" panose="020B0609020204030204" pitchFamily="49" charset="0"/>
+              </a:rPr>
+              <a:t>str</a:t>
             </a:r>
             <a:endParaRPr lang="en-US" sz="1400" b="0" dirty="0">
               <a:solidFill>
@@ -24129,7 +24285,7 @@
                 <a:spcPts val="1425"/>
               </a:lnSpc>
             </a:pPr>
-            <a:br>
+            <a:r>
               <a:rPr lang="en-US" sz="1400" b="0" dirty="0">
                 <a:solidFill>
                   <a:srgbClr val="333333"/>
@@ -24137,47 +24293,25 @@
                 <a:effectLst/>
                 <a:latin typeface="Consolas" panose="020B0609020204030204" pitchFamily="49" charset="0"/>
               </a:rPr>
-            </a:br>
-            <a:r>
-              <a:rPr lang="en-US" sz="1400" b="0" dirty="0">
-                <a:solidFill>
-                  <a:srgbClr val="679C00"/>
-                </a:solidFill>
-                <a:effectLst/>
-                <a:latin typeface="Consolas" panose="020B0609020204030204" pitchFamily="49" charset="0"/>
-              </a:rPr>
-              <a:t>@app.post</a:t>
-            </a:r>
-            <a:r>
-              <a:rPr lang="en-US" sz="1400" b="0" dirty="0">
-                <a:solidFill>
-                  <a:srgbClr val="333333"/>
-                </a:solidFill>
-                <a:effectLst/>
-                <a:latin typeface="Consolas" panose="020B0609020204030204" pitchFamily="49" charset="0"/>
-              </a:rPr>
-              <a:t>(</a:t>
-            </a:r>
-            <a:r>
-              <a:rPr lang="en-US" sz="1400" b="0" dirty="0">
-                <a:solidFill>
-                  <a:srgbClr val="998F2F"/>
-                </a:solidFill>
-                <a:effectLst/>
-                <a:latin typeface="Consolas" panose="020B0609020204030204" pitchFamily="49" charset="0"/>
-              </a:rPr>
-              <a:t>'/get_churn_probability'</a:t>
-            </a:r>
-            <a:r>
-              <a:rPr lang="en-US" sz="1400" b="0" dirty="0">
-                <a:solidFill>
-                  <a:srgbClr val="333333"/>
-                </a:solidFill>
-                <a:effectLst/>
-                <a:latin typeface="Consolas" panose="020B0609020204030204" pitchFamily="49" charset="0"/>
-              </a:rPr>
-              <a:t>)</a:t>
-            </a:r>
+              <a:t>    age: </a:t>
+            </a:r>
+            <a:r>
+              <a:rPr lang="en-US" sz="1400" b="0" i="1" dirty="0">
+                <a:solidFill>
+                  <a:srgbClr val="0089B3"/>
+                </a:solidFill>
+                <a:effectLst/>
+                <a:latin typeface="Consolas" panose="020B0609020204030204" pitchFamily="49" charset="0"/>
+              </a:rPr>
+              <a:t>int</a:t>
+            </a:r>
+            <a:endParaRPr lang="en-US" sz="1400" b="0" dirty="0">
+              <a:solidFill>
+                <a:srgbClr val="333333"/>
+              </a:solidFill>
+              <a:effectLst/>
+              <a:latin typeface="Consolas" panose="020B0609020204030204" pitchFamily="49" charset="0"/>
+            </a:endParaRPr>
           </a:p>
           <a:p>
             <a:pPr>
@@ -24186,6 +24320,36 @@
               </a:lnSpc>
             </a:pPr>
             <a:r>
+              <a:rPr lang="en-US" sz="1400" b="0" dirty="0">
+                <a:solidFill>
+                  <a:srgbClr val="333333"/>
+                </a:solidFill>
+                <a:effectLst/>
+                <a:latin typeface="Consolas" panose="020B0609020204030204" pitchFamily="49" charset="0"/>
+              </a:rPr>
+              <a:t>    </a:t>
+            </a:r>
+            <a:r>
+              <a:rPr lang="en-US" sz="1400" b="0" dirty="0" err="1">
+                <a:solidFill>
+                  <a:srgbClr val="333333"/>
+                </a:solidFill>
+                <a:effectLst/>
+                <a:latin typeface="Consolas" panose="020B0609020204030204" pitchFamily="49" charset="0"/>
+              </a:rPr>
+              <a:t>uc_grad</a:t>
+            </a:r>
+            <a:r>
+              <a:rPr lang="en-US" sz="1400" b="0" dirty="0">
+                <a:solidFill>
+                  <a:srgbClr val="333333"/>
+                </a:solidFill>
+                <a:effectLst/>
+                <a:latin typeface="Consolas" panose="020B0609020204030204" pitchFamily="49" charset="0"/>
+              </a:rPr>
+              <a:t>: </a:t>
+            </a:r>
+            <a:r>
               <a:rPr lang="en-US" sz="1400" b="0" i="1" dirty="0">
                 <a:solidFill>
                   <a:srgbClr val="0089B3"/>
@@ -24193,38 +24357,15 @@
                 <a:effectLst/>
                 <a:latin typeface="Consolas" panose="020B0609020204030204" pitchFamily="49" charset="0"/>
               </a:rPr>
-              <a:t>def</a:t>
-            </a:r>
-            <a:r>
-              <a:rPr lang="en-US" sz="1400" b="0" dirty="0">
-                <a:solidFill>
-                  <a:srgbClr val="333333"/>
-                </a:solidFill>
-                <a:effectLst/>
-                <a:latin typeface="Consolas" panose="020B0609020204030204" pitchFamily="49" charset="0"/>
-              </a:rPr>
-              <a:t> </a:t>
-            </a:r>
-            <a:r>
-              <a:rPr lang="en-US" sz="1400" b="0" dirty="0" err="1">
-                <a:solidFill>
-                  <a:srgbClr val="679C00"/>
-                </a:solidFill>
-                <a:effectLst/>
-                <a:latin typeface="Consolas" panose="020B0609020204030204" pitchFamily="49" charset="0"/>
-              </a:rPr>
-              <a:t>get_churn_probability</a:t>
-            </a:r>
-            <a:r>
-              <a:rPr lang="en-US" sz="1400" b="0" dirty="0">
-                <a:solidFill>
-                  <a:srgbClr val="333333"/>
-                </a:solidFill>
-                <a:effectLst/>
-                <a:latin typeface="Consolas" panose="020B0609020204030204" pitchFamily="49" charset="0"/>
-              </a:rPr>
-              <a:t>():</a:t>
-            </a:r>
+              <a:t>bool</a:t>
+            </a:r>
+            <a:endParaRPr lang="en-US" sz="1400" b="0" dirty="0">
+              <a:solidFill>
+                <a:srgbClr val="333333"/>
+              </a:solidFill>
+              <a:effectLst/>
+              <a:latin typeface="Consolas" panose="020B0609020204030204" pitchFamily="49" charset="0"/>
+            </a:endParaRPr>
           </a:p>
           <a:p>
             <a:pPr>
@@ -24244,72 +24385,42 @@
             <a:r>
               <a:rPr lang="en-US" sz="1400" b="0" dirty="0">
                 <a:solidFill>
+                  <a:srgbClr val="679C00"/>
+                </a:solidFill>
+                <a:effectLst/>
+                <a:latin typeface="Consolas" panose="020B0609020204030204" pitchFamily="49" charset="0"/>
+              </a:rPr>
+              <a:t>@app.post</a:t>
+            </a:r>
+            <a:r>
+              <a:rPr lang="en-US" sz="1400" b="0" dirty="0">
+                <a:solidFill>
                   <a:srgbClr val="333333"/>
                 </a:solidFill>
                 <a:effectLst/>
                 <a:latin typeface="Consolas" panose="020B0609020204030204" pitchFamily="49" charset="0"/>
               </a:rPr>
-              <a:t>    </a:t>
-            </a:r>
-            <a:r>
-              <a:rPr lang="en-US" sz="1400" b="0" dirty="0" err="1">
+              <a:t>(</a:t>
+            </a:r>
+            <a:r>
+              <a:rPr lang="en-US" sz="1400" b="0" dirty="0">
+                <a:solidFill>
+                  <a:srgbClr val="998F2F"/>
+                </a:solidFill>
+                <a:effectLst/>
+                <a:latin typeface="Consolas" panose="020B0609020204030204" pitchFamily="49" charset="0"/>
+              </a:rPr>
+              <a:t>'/get_churn_probability'</a:t>
+            </a:r>
+            <a:r>
+              <a:rPr lang="en-US" sz="1400" b="0" dirty="0">
                 <a:solidFill>
                   <a:srgbClr val="333333"/>
                 </a:solidFill>
                 <a:effectLst/>
                 <a:latin typeface="Consolas" panose="020B0609020204030204" pitchFamily="49" charset="0"/>
               </a:rPr>
-              <a:t>client_properties</a:t>
-            </a:r>
-            <a:r>
-              <a:rPr lang="en-US" sz="1400" b="0" dirty="0">
-                <a:solidFill>
-                  <a:srgbClr val="333333"/>
-                </a:solidFill>
-                <a:effectLst/>
-                <a:latin typeface="Consolas" panose="020B0609020204030204" pitchFamily="49" charset="0"/>
-              </a:rPr>
-              <a:t> </a:t>
-            </a:r>
-            <a:r>
-              <a:rPr lang="en-US" sz="1400" b="0" dirty="0">
-                <a:solidFill>
-                  <a:srgbClr val="F9005A"/>
-                </a:solidFill>
-                <a:effectLst/>
-                <a:latin typeface="Consolas" panose="020B0609020204030204" pitchFamily="49" charset="0"/>
-              </a:rPr>
-              <a:t>=</a:t>
-            </a:r>
-            <a:r>
-              <a:rPr lang="en-US" sz="1400" b="0" dirty="0">
-                <a:solidFill>
-                  <a:srgbClr val="333333"/>
-                </a:solidFill>
-                <a:effectLst/>
-                <a:latin typeface="Consolas" panose="020B0609020204030204" pitchFamily="49" charset="0"/>
-              </a:rPr>
-              <a:t> </a:t>
-            </a:r>
-            <a:r>
-              <a:rPr lang="en-US" sz="1400" b="0" dirty="0" err="1">
-                <a:solidFill>
-                  <a:srgbClr val="333333"/>
-                </a:solidFill>
-                <a:effectLst/>
-                <a:latin typeface="Consolas" panose="020B0609020204030204" pitchFamily="49" charset="0"/>
-              </a:rPr>
-              <a:t>request.get_json</a:t>
-            </a:r>
-            <a:r>
-              <a:rPr lang="en-US" sz="1400" b="0" dirty="0">
-                <a:solidFill>
-                  <a:srgbClr val="333333"/>
-                </a:solidFill>
-                <a:effectLst/>
-                <a:latin typeface="Consolas" panose="020B0609020204030204" pitchFamily="49" charset="0"/>
-              </a:rPr>
-              <a:t>()</a:t>
+              <a:t>)</a:t>
             </a:r>
           </a:p>
           <a:p>
@@ -24319,6 +24430,16 @@
               </a:lnSpc>
             </a:pPr>
             <a:r>
+              <a:rPr lang="en-US" sz="1400" b="0" i="1" dirty="0">
+                <a:solidFill>
+                  <a:srgbClr val="0089B3"/>
+                </a:solidFill>
+                <a:effectLst/>
+                <a:latin typeface="Consolas" panose="020B0609020204030204" pitchFamily="49" charset="0"/>
+              </a:rPr>
+              <a:t>def</a:t>
+            </a:r>
+            <a:r>
               <a:rPr lang="en-US" sz="1400" b="0" dirty="0">
                 <a:solidFill>
                   <a:srgbClr val="333333"/>
@@ -24326,17 +24447,37 @@
                 <a:effectLst/>
                 <a:latin typeface="Consolas" panose="020B0609020204030204" pitchFamily="49" charset="0"/>
               </a:rPr>
-              <a:t>    </a:t>
+              <a:t> </a:t>
+            </a:r>
+            <a:r>
+              <a:rPr lang="en-US" sz="1400" b="0" dirty="0" err="1">
+                <a:solidFill>
+                  <a:srgbClr val="679C00"/>
+                </a:solidFill>
+                <a:effectLst/>
+                <a:latin typeface="Consolas" panose="020B0609020204030204" pitchFamily="49" charset="0"/>
+              </a:rPr>
+              <a:t>get_churn_probability</a:t>
             </a:r>
             <a:r>
               <a:rPr lang="en-US" sz="1400" b="0" dirty="0">
                 <a:solidFill>
-                  <a:srgbClr val="0089B3"/>
-                </a:solidFill>
-                <a:effectLst/>
-                <a:latin typeface="Consolas" panose="020B0609020204030204" pitchFamily="49" charset="0"/>
-              </a:rPr>
-              <a:t>print</a:t>
+                  <a:srgbClr val="333333"/>
+                </a:solidFill>
+                <a:effectLst/>
+                <a:latin typeface="Consolas" panose="020B0609020204030204" pitchFamily="49" charset="0"/>
+              </a:rPr>
+              <a:t>(</a:t>
+            </a:r>
+            <a:r>
+              <a:rPr lang="en-US" sz="1400" b="0" dirty="0" err="1">
+                <a:solidFill>
+                  <a:srgbClr val="CF7000"/>
+                </a:solidFill>
+                <a:effectLst/>
+                <a:latin typeface="Consolas" panose="020B0609020204030204" pitchFamily="49" charset="0"/>
+              </a:rPr>
+              <a:t>client_props</a:t>
             </a:r>
             <a:r>
               <a:rPr lang="en-US" sz="1400" b="0" dirty="0">
@@ -24346,7 +24487,7 @@
                 <a:effectLst/>
                 <a:latin typeface="Consolas" panose="020B0609020204030204" pitchFamily="49" charset="0"/>
               </a:rPr>
-              <a:t>(</a:t>
+              <a:t>: </a:t>
             </a:r>
             <a:r>
               <a:rPr lang="en-US" sz="1400" b="0" dirty="0" err="1">
@@ -24356,7 +24497,7 @@
                 <a:effectLst/>
                 <a:latin typeface="Consolas" panose="020B0609020204030204" pitchFamily="49" charset="0"/>
               </a:rPr>
-              <a:t>client_properties</a:t>
+              <a:t>ClientData</a:t>
             </a:r>
             <a:r>
               <a:rPr lang="en-US" sz="1400" b="0" dirty="0">
@@ -24366,84 +24507,7 @@
                 <a:effectLst/>
                 <a:latin typeface="Consolas" panose="020B0609020204030204" pitchFamily="49" charset="0"/>
               </a:rPr>
-              <a:t>)</a:t>
-            </a:r>
-          </a:p>
-          <a:p>
-            <a:pPr>
-              <a:lnSpc>
-                <a:spcPts val="1425"/>
-              </a:lnSpc>
-            </a:pPr>
-            <a:r>
-              <a:rPr lang="en-US" sz="1400" b="0" dirty="0">
-                <a:solidFill>
-                  <a:srgbClr val="333333"/>
-                </a:solidFill>
-                <a:effectLst/>
-                <a:latin typeface="Consolas" panose="020B0609020204030204" pitchFamily="49" charset="0"/>
-              </a:rPr>
-              <a:t>    </a:t>
-            </a:r>
-            <a:r>
-              <a:rPr lang="en-US" sz="1400" b="0" dirty="0">
-                <a:solidFill>
-                  <a:srgbClr val="0089B3"/>
-                </a:solidFill>
-                <a:effectLst/>
-                <a:latin typeface="Consolas" panose="020B0609020204030204" pitchFamily="49" charset="0"/>
-              </a:rPr>
-              <a:t>print</a:t>
-            </a:r>
-            <a:r>
-              <a:rPr lang="en-US" sz="1400" b="0" dirty="0">
-                <a:solidFill>
-                  <a:srgbClr val="333333"/>
-                </a:solidFill>
-                <a:effectLst/>
-                <a:latin typeface="Consolas" panose="020B0609020204030204" pitchFamily="49" charset="0"/>
-              </a:rPr>
-              <a:t>(</a:t>
-            </a:r>
-            <a:r>
-              <a:rPr lang="en-US" sz="1400" b="0" i="1" dirty="0">
-                <a:solidFill>
-                  <a:srgbClr val="0089B3"/>
-                </a:solidFill>
-                <a:effectLst/>
-                <a:latin typeface="Consolas" panose="020B0609020204030204" pitchFamily="49" charset="0"/>
-              </a:rPr>
-              <a:t>type</a:t>
-            </a:r>
-            <a:r>
-              <a:rPr lang="en-US" sz="1400" b="0" dirty="0">
-                <a:solidFill>
-                  <a:srgbClr val="333333"/>
-                </a:solidFill>
-                <a:effectLst/>
-                <a:latin typeface="Consolas" panose="020B0609020204030204" pitchFamily="49" charset="0"/>
-              </a:rPr>
-              <a:t>(</a:t>
-            </a:r>
-            <a:r>
-              <a:rPr lang="en-US" sz="1400" b="0" dirty="0" err="1">
-                <a:solidFill>
-                  <a:srgbClr val="333333"/>
-                </a:solidFill>
-                <a:effectLst/>
-                <a:latin typeface="Consolas" panose="020B0609020204030204" pitchFamily="49" charset="0"/>
-              </a:rPr>
-              <a:t>client_properties</a:t>
-            </a:r>
-            <a:r>
-              <a:rPr lang="en-US" sz="1400" b="0" dirty="0">
-                <a:solidFill>
-                  <a:srgbClr val="333333"/>
-                </a:solidFill>
-                <a:effectLst/>
-                <a:latin typeface="Consolas" panose="020B0609020204030204" pitchFamily="49" charset="0"/>
-              </a:rPr>
-              <a:t>))</a:t>
+              <a:t>):</a:t>
             </a:r>
           </a:p>
           <a:p>
@@ -24630,7 +24694,7 @@
                 <a:effectLst/>
                 <a:latin typeface="Consolas" panose="020B0609020204030204" pitchFamily="49" charset="0"/>
               </a:rPr>
-              <a:t>client_properties</a:t>
+              <a:t>client_props.uc_grad</a:t>
             </a:r>
             <a:r>
               <a:rPr lang="en-US" sz="1400" b="0" dirty="0">
@@ -24640,47 +24704,47 @@
                 <a:effectLst/>
                 <a:latin typeface="Consolas" panose="020B0609020204030204" pitchFamily="49" charset="0"/>
               </a:rPr>
-              <a:t>[</a:t>
+              <a:t> </a:t>
             </a:r>
             <a:r>
               <a:rPr lang="en-US" sz="1400" b="0" dirty="0">
                 <a:solidFill>
+                  <a:srgbClr val="F9005A"/>
+                </a:solidFill>
+                <a:effectLst/>
+                <a:latin typeface="Consolas" panose="020B0609020204030204" pitchFamily="49" charset="0"/>
+              </a:rPr>
+              <a:t>==</a:t>
+            </a:r>
+            <a:r>
+              <a:rPr lang="en-US" sz="1400" b="0" dirty="0">
+                <a:solidFill>
+                  <a:srgbClr val="333333"/>
+                </a:solidFill>
+                <a:effectLst/>
+                <a:latin typeface="Consolas" panose="020B0609020204030204" pitchFamily="49" charset="0"/>
+              </a:rPr>
+              <a:t> </a:t>
+            </a:r>
+            <a:r>
+              <a:rPr lang="en-US" sz="1400" b="0" dirty="0">
+                <a:solidFill>
                   <a:srgbClr val="998F2F"/>
                 </a:solidFill>
                 <a:effectLst/>
                 <a:latin typeface="Consolas" panose="020B0609020204030204" pitchFamily="49" charset="0"/>
               </a:rPr>
-              <a:t>'</a:t>
-            </a:r>
-            <a:r>
-              <a:rPr lang="en-US" sz="1400" b="0" dirty="0" err="1">
-                <a:solidFill>
-                  <a:srgbClr val="998F2F"/>
-                </a:solidFill>
-                <a:effectLst/>
-                <a:latin typeface="Consolas" panose="020B0609020204030204" pitchFamily="49" charset="0"/>
-              </a:rPr>
-              <a:t>uc_grad</a:t>
+              <a:t>"true"</a:t>
             </a:r>
             <a:r>
               <a:rPr lang="en-US" sz="1400" b="0" dirty="0">
                 <a:solidFill>
-                  <a:srgbClr val="998F2F"/>
-                </a:solidFill>
-                <a:effectLst/>
-                <a:latin typeface="Consolas" panose="020B0609020204030204" pitchFamily="49" charset="0"/>
-              </a:rPr>
-              <a:t>'</a:t>
-            </a:r>
-            <a:r>
-              <a:rPr lang="en-US" sz="1400" b="0" dirty="0">
-                <a:solidFill>
                   <a:srgbClr val="333333"/>
                 </a:solidFill>
                 <a:effectLst/>
                 <a:latin typeface="Consolas" panose="020B0609020204030204" pitchFamily="49" charset="0"/>
               </a:rPr>
-              <a:t>]:</a:t>
+              <a:t>:</a:t>
             </a:r>
           </a:p>
           <a:p>
@@ -24717,67 +24781,47 @@
                 <a:effectLst/>
                 <a:latin typeface="Consolas" panose="020B0609020204030204" pitchFamily="49" charset="0"/>
               </a:rPr>
-              <a:t> </a:t>
-            </a:r>
-            <a:r>
-              <a:rPr lang="en-US" sz="1400" b="0" dirty="0" err="1">
+              <a:t> {</a:t>
+            </a:r>
+            <a:r>
+              <a:rPr lang="en-US" sz="1400" b="0" dirty="0">
+                <a:solidFill>
+                  <a:srgbClr val="998F2F"/>
+                </a:solidFill>
+                <a:effectLst/>
+                <a:latin typeface="Consolas" panose="020B0609020204030204" pitchFamily="49" charset="0"/>
+              </a:rPr>
+              <a:t>'churn_prob'</a:t>
+            </a:r>
+            <a:r>
+              <a:rPr lang="en-US" sz="1400" b="0" dirty="0">
                 <a:solidFill>
                   <a:srgbClr val="333333"/>
                 </a:solidFill>
                 <a:effectLst/>
                 <a:latin typeface="Consolas" panose="020B0609020204030204" pitchFamily="49" charset="0"/>
               </a:rPr>
-              <a:t>jsonify</a:t>
+              <a:t>:</a:t>
             </a:r>
             <a:r>
               <a:rPr lang="en-US" sz="1400" b="0" dirty="0">
                 <a:solidFill>
+                  <a:srgbClr val="684D99"/>
+                </a:solidFill>
+                <a:effectLst/>
+                <a:latin typeface="Consolas" panose="020B0609020204030204" pitchFamily="49" charset="0"/>
+              </a:rPr>
+              <a:t>0.34</a:t>
+            </a:r>
+            <a:r>
+              <a:rPr lang="en-US" sz="1400" b="0" dirty="0">
+                <a:solidFill>
                   <a:srgbClr val="333333"/>
                 </a:solidFill>
                 <a:effectLst/>
                 <a:latin typeface="Consolas" panose="020B0609020204030204" pitchFamily="49" charset="0"/>
               </a:rPr>
-              <a:t>({</a:t>
-            </a:r>
-            <a:r>
-              <a:rPr lang="en-US" sz="1400" b="0" dirty="0">
-                <a:solidFill>
-                  <a:srgbClr val="998F2F"/>
-                </a:solidFill>
-                <a:effectLst/>
-                <a:latin typeface="Consolas" panose="020B0609020204030204" pitchFamily="49" charset="0"/>
-              </a:rPr>
-              <a:t>'churn_prob'</a:t>
-            </a:r>
-            <a:r>
-              <a:rPr lang="en-US" sz="1400" b="0" dirty="0">
-                <a:solidFill>
-                  <a:srgbClr val="333333"/>
-                </a:solidFill>
-                <a:effectLst/>
-                <a:latin typeface="Consolas" panose="020B0609020204030204" pitchFamily="49" charset="0"/>
-              </a:rPr>
-              <a:t>:</a:t>
-            </a:r>
-            <a:r>
-              <a:rPr lang="en-US" sz="1400" b="0" dirty="0">
-                <a:solidFill>
-                  <a:srgbClr val="684D99"/>
-                </a:solidFill>
-                <a:effectLst/>
-                <a:latin typeface="Consolas" panose="020B0609020204030204" pitchFamily="49" charset="0"/>
-              </a:rPr>
-              <a:t>0.34</a:t>
-            </a:r>
-            <a:r>
-              <a:rPr lang="en-US" sz="1400" b="0" dirty="0">
-                <a:solidFill>
-                  <a:srgbClr val="333333"/>
-                </a:solidFill>
-                <a:effectLst/>
-                <a:latin typeface="Consolas" panose="020B0609020204030204" pitchFamily="49" charset="0"/>
-              </a:rPr>
-              <a:t>})</a:t>
+              <a:t>}</a:t>
             </a:r>
           </a:p>
           <a:p>
@@ -24851,67 +24895,47 @@
                 <a:effectLst/>
                 <a:latin typeface="Consolas" panose="020B0609020204030204" pitchFamily="49" charset="0"/>
               </a:rPr>
-              <a:t> </a:t>
-            </a:r>
-            <a:r>
-              <a:rPr lang="en-US" sz="1400" b="0" dirty="0" err="1">
+              <a:t> {</a:t>
+            </a:r>
+            <a:r>
+              <a:rPr lang="en-US" sz="1400" b="0" dirty="0">
+                <a:solidFill>
+                  <a:srgbClr val="998F2F"/>
+                </a:solidFill>
+                <a:effectLst/>
+                <a:latin typeface="Consolas" panose="020B0609020204030204" pitchFamily="49" charset="0"/>
+              </a:rPr>
+              <a:t>'churn_prob'</a:t>
+            </a:r>
+            <a:r>
+              <a:rPr lang="en-US" sz="1400" b="0" dirty="0">
                 <a:solidFill>
                   <a:srgbClr val="333333"/>
                 </a:solidFill>
                 <a:effectLst/>
                 <a:latin typeface="Consolas" panose="020B0609020204030204" pitchFamily="49" charset="0"/>
               </a:rPr>
-              <a:t>jsonify</a:t>
+              <a:t>:</a:t>
             </a:r>
             <a:r>
               <a:rPr lang="en-US" sz="1400" b="0" dirty="0">
                 <a:solidFill>
+                  <a:srgbClr val="684D99"/>
+                </a:solidFill>
+                <a:effectLst/>
+                <a:latin typeface="Consolas" panose="020B0609020204030204" pitchFamily="49" charset="0"/>
+              </a:rPr>
+              <a:t>0.87</a:t>
+            </a:r>
+            <a:r>
+              <a:rPr lang="en-US" sz="1400" b="0" dirty="0">
+                <a:solidFill>
                   <a:srgbClr val="333333"/>
                 </a:solidFill>
                 <a:effectLst/>
                 <a:latin typeface="Consolas" panose="020B0609020204030204" pitchFamily="49" charset="0"/>
               </a:rPr>
-              <a:t>({</a:t>
-            </a:r>
-            <a:r>
-              <a:rPr lang="en-US" sz="1400" b="0" dirty="0">
-                <a:solidFill>
-                  <a:srgbClr val="998F2F"/>
-                </a:solidFill>
-                <a:effectLst/>
-                <a:latin typeface="Consolas" panose="020B0609020204030204" pitchFamily="49" charset="0"/>
-              </a:rPr>
-              <a:t>'churn_prob'</a:t>
-            </a:r>
-            <a:r>
-              <a:rPr lang="en-US" sz="1400" b="0" dirty="0">
-                <a:solidFill>
-                  <a:srgbClr val="333333"/>
-                </a:solidFill>
-                <a:effectLst/>
-                <a:latin typeface="Consolas" panose="020B0609020204030204" pitchFamily="49" charset="0"/>
-              </a:rPr>
-              <a:t>:</a:t>
-            </a:r>
-            <a:r>
-              <a:rPr lang="en-US" sz="1400" b="0" dirty="0">
-                <a:solidFill>
-                  <a:srgbClr val="684D99"/>
-                </a:solidFill>
-                <a:effectLst/>
-                <a:latin typeface="Consolas" panose="020B0609020204030204" pitchFamily="49" charset="0"/>
-              </a:rPr>
-              <a:t>0.87</a:t>
-            </a:r>
-            <a:r>
-              <a:rPr lang="en-US" sz="1400" b="0" dirty="0">
-                <a:solidFill>
-                  <a:srgbClr val="333333"/>
-                </a:solidFill>
-                <a:effectLst/>
-                <a:latin typeface="Consolas" panose="020B0609020204030204" pitchFamily="49" charset="0"/>
-              </a:rPr>
-              <a:t>})</a:t>
+              <a:t>}</a:t>
             </a:r>
           </a:p>
           <a:p>
@@ -24957,8 +24981,22 @@
                 <a:effectLst/>
                 <a:latin typeface="Consolas" panose="020B0609020204030204" pitchFamily="49" charset="0"/>
               </a:rPr>
-              <a:t> dev serve_json.py</a:t>
-            </a:r>
+              <a:t> dev serve_post_json.py</a:t>
+            </a:r>
+            <a:endParaRPr lang="en-US" sz="1400" b="0" dirty="0">
+              <a:solidFill>
+                <a:srgbClr val="333333"/>
+              </a:solidFill>
+              <a:effectLst/>
+              <a:latin typeface="Consolas" panose="020B0609020204030204" pitchFamily="49" charset="0"/>
+            </a:endParaRPr>
+          </a:p>
+          <a:p>
+            <a:pPr>
+              <a:lnSpc>
+                <a:spcPts val="1425"/>
+              </a:lnSpc>
+            </a:pPr>
             <a:endParaRPr lang="en-US" sz="1400" b="0" dirty="0">
               <a:solidFill>
                 <a:srgbClr val="333333"/>
@@ -25030,49 +25068,6 @@
               </a:solidFill>
               <a:latin typeface="Georgia" panose="02040502050405020303" pitchFamily="18" charset="0"/>
             </a:endParaRPr>
-          </a:p>
-        </p:txBody>
-      </p:sp>
-      <p:sp>
-        <p:nvSpPr>
-          <p:cNvPr id="3" name="TextBox 2">
-            <a:extLst>
-              <a:ext uri="{FF2B5EF4-FFF2-40B4-BE49-F238E27FC236}">
-                <a16:creationId xmlns:a16="http://schemas.microsoft.com/office/drawing/2014/main" id="{76BD1211-8EC5-9945-C383-92BB2F9F0464}"/>
-              </a:ext>
-            </a:extLst>
-          </p:cNvPr>
-          <p:cNvSpPr txBox="1"/>
-          <p:nvPr/>
-        </p:nvSpPr>
-        <p:spPr>
-          <a:xfrm>
-            <a:off x="838200" y="6354374"/>
-            <a:ext cx="3159839" cy="215444"/>
-          </a:xfrm>
-          <a:prstGeom prst="rect">
-            <a:avLst/>
-          </a:prstGeom>
-          <a:noFill/>
-        </p:spPr>
-        <p:txBody>
-          <a:bodyPr wrap="none" rtlCol="0">
-            <a:spAutoFit/>
-          </a:bodyPr>
-          <a:lstStyle/>
-          <a:p>
-            <a:r>
-              <a:rPr lang="en-US" sz="800" dirty="0">
-                <a:solidFill>
-                  <a:schemeClr val="tx1">
-                    <a:lumMod val="75000"/>
-                    <a:lumOff val="25000"/>
-                  </a:schemeClr>
-                </a:solidFill>
-                <a:latin typeface="Georgia" panose="02040502050405020303" pitchFamily="18" charset="0"/>
-              </a:rPr>
-              <a:t>See file 075_web_services_under_the_hood/serve_post_json.py</a:t>
-            </a:r>
           </a:p>
         </p:txBody>
       </p:sp>

</xml_diff>